<commit_message>
tmadhyastha diagram reworked in PowerPoint
</commit_message>
<xml_diff>
--- a/case-studies/tmadhyastha.pptx
+++ b/case-studies/tmadhyastha.pptx
@@ -4,6 +4,9 @@
   <p:sldMasterIdLst>
     <p:sldMasterId id="2147483660" r:id="rId1"/>
   </p:sldMasterIdLst>
+  <p:notesMasterIdLst>
+    <p:notesMasterId r:id="rId3"/>
+  </p:notesMasterIdLst>
   <p:sldIdLst>
     <p:sldId id="256" r:id="rId2"/>
   </p:sldIdLst>
@@ -104,7 +107,457 @@
       </a:defRPr>
     </a:lvl9pPr>
   </p:defaultTextStyle>
+  <p:extLst>
+    <p:ext uri="{EFAFB233-063F-42B5-8137-9DF3F51BA10A}">
+      <p15:sldGuideLst xmlns:p15="http://schemas.microsoft.com/office/powerpoint/2012/main">
+        <p15:guide id="1" orient="horz" pos="2448">
+          <p15:clr>
+            <a:srgbClr val="A4A3A4"/>
+          </p15:clr>
+        </p15:guide>
+        <p15:guide id="2" pos="2880">
+          <p15:clr>
+            <a:srgbClr val="A4A3A4"/>
+          </p15:clr>
+        </p15:guide>
+      </p15:sldGuideLst>
+    </p:ext>
+  </p:extLst>
 </p:presentation>
+</file>
+
+<file path=ppt/notesMasters/notesMaster1.xml><?xml version="1.0" encoding="utf-8"?>
+<p:notesMaster xmlns:a="http://schemas.openxmlformats.org/drawingml/2006/main" xmlns:r="http://schemas.openxmlformats.org/officeDocument/2006/relationships" xmlns:p="http://schemas.openxmlformats.org/presentationml/2006/main">
+  <p:cSld>
+    <p:bg>
+      <p:bgRef idx="1001">
+        <a:schemeClr val="bg1"/>
+      </p:bgRef>
+    </p:bg>
+    <p:spTree>
+      <p:nvGrpSpPr>
+        <p:cNvPr id="1" name=""/>
+        <p:cNvGrpSpPr/>
+        <p:nvPr/>
+      </p:nvGrpSpPr>
+      <p:grpSpPr>
+        <a:xfrm>
+          <a:off x="0" y="0"/>
+          <a:ext cx="0" cy="0"/>
+          <a:chOff x="0" y="0"/>
+          <a:chExt cx="0" cy="0"/>
+        </a:xfrm>
+      </p:grpSpPr>
+      <p:sp>
+        <p:nvSpPr>
+          <p:cNvPr id="2" name="Header Placeholder 1"/>
+          <p:cNvSpPr>
+            <a:spLocks noGrp="1"/>
+          </p:cNvSpPr>
+          <p:nvPr>
+            <p:ph type="hdr" sz="quarter"/>
+          </p:nvPr>
+        </p:nvSpPr>
+        <p:spPr>
+          <a:xfrm>
+            <a:off x="0" y="0"/>
+            <a:ext cx="2971800" cy="458788"/>
+          </a:xfrm>
+          <a:prstGeom prst="rect">
+            <a:avLst/>
+          </a:prstGeom>
+        </p:spPr>
+        <p:txBody>
+          <a:bodyPr vert="horz" lIns="91440" tIns="45720" rIns="91440" bIns="45720" rtlCol="0"/>
+          <a:lstStyle>
+            <a:lvl1pPr algn="l">
+              <a:defRPr sz="1200"/>
+            </a:lvl1pPr>
+          </a:lstStyle>
+          <a:p>
+            <a:endParaRPr lang="en-US"/>
+          </a:p>
+        </p:txBody>
+      </p:sp>
+      <p:sp>
+        <p:nvSpPr>
+          <p:cNvPr id="3" name="Date Placeholder 2"/>
+          <p:cNvSpPr>
+            <a:spLocks noGrp="1"/>
+          </p:cNvSpPr>
+          <p:nvPr>
+            <p:ph type="dt" idx="1"/>
+          </p:nvPr>
+        </p:nvSpPr>
+        <p:spPr>
+          <a:xfrm>
+            <a:off x="3884613" y="0"/>
+            <a:ext cx="2971800" cy="458788"/>
+          </a:xfrm>
+          <a:prstGeom prst="rect">
+            <a:avLst/>
+          </a:prstGeom>
+        </p:spPr>
+        <p:txBody>
+          <a:bodyPr vert="horz" lIns="91440" tIns="45720" rIns="91440" bIns="45720" rtlCol="0"/>
+          <a:lstStyle>
+            <a:lvl1pPr algn="r">
+              <a:defRPr sz="1200"/>
+            </a:lvl1pPr>
+          </a:lstStyle>
+          <a:p>
+            <a:fld id="{BC805A88-CCCA-4043-879A-D17D12357417}" type="datetimeFigureOut">
+              <a:rPr lang="en-US" smtClean="0"/>
+              <a:t>9/20/16</a:t>
+            </a:fld>
+            <a:endParaRPr lang="en-US"/>
+          </a:p>
+        </p:txBody>
+      </p:sp>
+      <p:sp>
+        <p:nvSpPr>
+          <p:cNvPr id="4" name="Slide Image Placeholder 3"/>
+          <p:cNvSpPr>
+            <a:spLocks noGrp="1" noRot="1" noChangeAspect="1"/>
+          </p:cNvSpPr>
+          <p:nvPr>
+            <p:ph type="sldImg" idx="2"/>
+          </p:nvPr>
+        </p:nvSpPr>
+        <p:spPr>
+          <a:xfrm>
+            <a:off x="1612900" y="1143000"/>
+            <a:ext cx="3632200" cy="3086100"/>
+          </a:xfrm>
+          <a:prstGeom prst="rect">
+            <a:avLst/>
+          </a:prstGeom>
+          <a:noFill/>
+          <a:ln w="12700">
+            <a:solidFill>
+              <a:prstClr val="black"/>
+            </a:solidFill>
+          </a:ln>
+        </p:spPr>
+        <p:txBody>
+          <a:bodyPr vert="horz" lIns="91440" tIns="45720" rIns="91440" bIns="45720" rtlCol="0" anchor="ctr"/>
+          <a:lstStyle/>
+          <a:p>
+            <a:endParaRPr lang="en-US"/>
+          </a:p>
+        </p:txBody>
+      </p:sp>
+      <p:sp>
+        <p:nvSpPr>
+          <p:cNvPr id="5" name="Notes Placeholder 4"/>
+          <p:cNvSpPr>
+            <a:spLocks noGrp="1"/>
+          </p:cNvSpPr>
+          <p:nvPr>
+            <p:ph type="body" sz="quarter" idx="3"/>
+          </p:nvPr>
+        </p:nvSpPr>
+        <p:spPr>
+          <a:xfrm>
+            <a:off x="685800" y="4400550"/>
+            <a:ext cx="5486400" cy="3600450"/>
+          </a:xfrm>
+          <a:prstGeom prst="rect">
+            <a:avLst/>
+          </a:prstGeom>
+        </p:spPr>
+        <p:txBody>
+          <a:bodyPr vert="horz" lIns="91440" tIns="45720" rIns="91440" bIns="45720" rtlCol="0"/>
+          <a:lstStyle/>
+          <a:p>
+            <a:pPr lvl="0"/>
+            <a:r>
+              <a:rPr lang="en-US" smtClean="0"/>
+              <a:t>Click to edit Master text styles</a:t>
+            </a:r>
+          </a:p>
+          <a:p>
+            <a:pPr lvl="1"/>
+            <a:r>
+              <a:rPr lang="en-US" smtClean="0"/>
+              <a:t>Second level</a:t>
+            </a:r>
+          </a:p>
+          <a:p>
+            <a:pPr lvl="2"/>
+            <a:r>
+              <a:rPr lang="en-US" smtClean="0"/>
+              <a:t>Third level</a:t>
+            </a:r>
+          </a:p>
+          <a:p>
+            <a:pPr lvl="3"/>
+            <a:r>
+              <a:rPr lang="en-US" smtClean="0"/>
+              <a:t>Fourth level</a:t>
+            </a:r>
+          </a:p>
+          <a:p>
+            <a:pPr lvl="4"/>
+            <a:r>
+              <a:rPr lang="en-US" smtClean="0"/>
+              <a:t>Fifth level</a:t>
+            </a:r>
+            <a:endParaRPr lang="en-US"/>
+          </a:p>
+        </p:txBody>
+      </p:sp>
+      <p:sp>
+        <p:nvSpPr>
+          <p:cNvPr id="6" name="Footer Placeholder 5"/>
+          <p:cNvSpPr>
+            <a:spLocks noGrp="1"/>
+          </p:cNvSpPr>
+          <p:nvPr>
+            <p:ph type="ftr" sz="quarter" idx="4"/>
+          </p:nvPr>
+        </p:nvSpPr>
+        <p:spPr>
+          <a:xfrm>
+            <a:off x="0" y="8685213"/>
+            <a:ext cx="2971800" cy="458787"/>
+          </a:xfrm>
+          <a:prstGeom prst="rect">
+            <a:avLst/>
+          </a:prstGeom>
+        </p:spPr>
+        <p:txBody>
+          <a:bodyPr vert="horz" lIns="91440" tIns="45720" rIns="91440" bIns="45720" rtlCol="0" anchor="b"/>
+          <a:lstStyle>
+            <a:lvl1pPr algn="l">
+              <a:defRPr sz="1200"/>
+            </a:lvl1pPr>
+          </a:lstStyle>
+          <a:p>
+            <a:endParaRPr lang="en-US"/>
+          </a:p>
+        </p:txBody>
+      </p:sp>
+      <p:sp>
+        <p:nvSpPr>
+          <p:cNvPr id="7" name="Slide Number Placeholder 6"/>
+          <p:cNvSpPr>
+            <a:spLocks noGrp="1"/>
+          </p:cNvSpPr>
+          <p:nvPr>
+            <p:ph type="sldNum" sz="quarter" idx="5"/>
+          </p:nvPr>
+        </p:nvSpPr>
+        <p:spPr>
+          <a:xfrm>
+            <a:off x="3884613" y="8685213"/>
+            <a:ext cx="2971800" cy="458787"/>
+          </a:xfrm>
+          <a:prstGeom prst="rect">
+            <a:avLst/>
+          </a:prstGeom>
+        </p:spPr>
+        <p:txBody>
+          <a:bodyPr vert="horz" lIns="91440" tIns="45720" rIns="91440" bIns="45720" rtlCol="0" anchor="b"/>
+          <a:lstStyle>
+            <a:lvl1pPr algn="r">
+              <a:defRPr sz="1200"/>
+            </a:lvl1pPr>
+          </a:lstStyle>
+          <a:p>
+            <a:fld id="{D9A87FF9-2FC4-B549-8557-14D4E4289040}" type="slidenum">
+              <a:rPr lang="en-US" smtClean="0"/>
+              <a:t>‹#›</a:t>
+            </a:fld>
+            <a:endParaRPr lang="en-US"/>
+          </a:p>
+        </p:txBody>
+      </p:sp>
+    </p:spTree>
+    <p:extLst>
+      <p:ext uri="{BB962C8B-B14F-4D97-AF65-F5344CB8AC3E}">
+        <p14:creationId xmlns:p14="http://schemas.microsoft.com/office/powerpoint/2010/main" val="1122559107"/>
+      </p:ext>
+    </p:extLst>
+  </p:cSld>
+  <p:clrMap bg1="lt1" tx1="dk1" bg2="lt2" tx2="dk2" accent1="accent1" accent2="accent2" accent3="accent3" accent4="accent4" accent5="accent5" accent6="accent6" hlink="hlink" folHlink="folHlink"/>
+  <p:notesStyle>
+    <a:lvl1pPr marL="0" algn="l" defTabSz="914400" rtl="0" eaLnBrk="1" latinLnBrk="0" hangingPunct="1">
+      <a:defRPr sz="1200" kern="1200">
+        <a:solidFill>
+          <a:schemeClr val="tx1"/>
+        </a:solidFill>
+        <a:latin typeface="+mn-lt"/>
+        <a:ea typeface="+mn-ea"/>
+        <a:cs typeface="+mn-cs"/>
+      </a:defRPr>
+    </a:lvl1pPr>
+    <a:lvl2pPr marL="457200" algn="l" defTabSz="914400" rtl="0" eaLnBrk="1" latinLnBrk="0" hangingPunct="1">
+      <a:defRPr sz="1200" kern="1200">
+        <a:solidFill>
+          <a:schemeClr val="tx1"/>
+        </a:solidFill>
+        <a:latin typeface="+mn-lt"/>
+        <a:ea typeface="+mn-ea"/>
+        <a:cs typeface="+mn-cs"/>
+      </a:defRPr>
+    </a:lvl2pPr>
+    <a:lvl3pPr marL="914400" algn="l" defTabSz="914400" rtl="0" eaLnBrk="1" latinLnBrk="0" hangingPunct="1">
+      <a:defRPr sz="1200" kern="1200">
+        <a:solidFill>
+          <a:schemeClr val="tx1"/>
+        </a:solidFill>
+        <a:latin typeface="+mn-lt"/>
+        <a:ea typeface="+mn-ea"/>
+        <a:cs typeface="+mn-cs"/>
+      </a:defRPr>
+    </a:lvl3pPr>
+    <a:lvl4pPr marL="1371600" algn="l" defTabSz="914400" rtl="0" eaLnBrk="1" latinLnBrk="0" hangingPunct="1">
+      <a:defRPr sz="1200" kern="1200">
+        <a:solidFill>
+          <a:schemeClr val="tx1"/>
+        </a:solidFill>
+        <a:latin typeface="+mn-lt"/>
+        <a:ea typeface="+mn-ea"/>
+        <a:cs typeface="+mn-cs"/>
+      </a:defRPr>
+    </a:lvl4pPr>
+    <a:lvl5pPr marL="1828800" algn="l" defTabSz="914400" rtl="0" eaLnBrk="1" latinLnBrk="0" hangingPunct="1">
+      <a:defRPr sz="1200" kern="1200">
+        <a:solidFill>
+          <a:schemeClr val="tx1"/>
+        </a:solidFill>
+        <a:latin typeface="+mn-lt"/>
+        <a:ea typeface="+mn-ea"/>
+        <a:cs typeface="+mn-cs"/>
+      </a:defRPr>
+    </a:lvl5pPr>
+    <a:lvl6pPr marL="2286000" algn="l" defTabSz="914400" rtl="0" eaLnBrk="1" latinLnBrk="0" hangingPunct="1">
+      <a:defRPr sz="1200" kern="1200">
+        <a:solidFill>
+          <a:schemeClr val="tx1"/>
+        </a:solidFill>
+        <a:latin typeface="+mn-lt"/>
+        <a:ea typeface="+mn-ea"/>
+        <a:cs typeface="+mn-cs"/>
+      </a:defRPr>
+    </a:lvl6pPr>
+    <a:lvl7pPr marL="2743200" algn="l" defTabSz="914400" rtl="0" eaLnBrk="1" latinLnBrk="0" hangingPunct="1">
+      <a:defRPr sz="1200" kern="1200">
+        <a:solidFill>
+          <a:schemeClr val="tx1"/>
+        </a:solidFill>
+        <a:latin typeface="+mn-lt"/>
+        <a:ea typeface="+mn-ea"/>
+        <a:cs typeface="+mn-cs"/>
+      </a:defRPr>
+    </a:lvl7pPr>
+    <a:lvl8pPr marL="3200400" algn="l" defTabSz="914400" rtl="0" eaLnBrk="1" latinLnBrk="0" hangingPunct="1">
+      <a:defRPr sz="1200" kern="1200">
+        <a:solidFill>
+          <a:schemeClr val="tx1"/>
+        </a:solidFill>
+        <a:latin typeface="+mn-lt"/>
+        <a:ea typeface="+mn-ea"/>
+        <a:cs typeface="+mn-cs"/>
+      </a:defRPr>
+    </a:lvl8pPr>
+    <a:lvl9pPr marL="3657600" algn="l" defTabSz="914400" rtl="0" eaLnBrk="1" latinLnBrk="0" hangingPunct="1">
+      <a:defRPr sz="1200" kern="1200">
+        <a:solidFill>
+          <a:schemeClr val="tx1"/>
+        </a:solidFill>
+        <a:latin typeface="+mn-lt"/>
+        <a:ea typeface="+mn-ea"/>
+        <a:cs typeface="+mn-cs"/>
+      </a:defRPr>
+    </a:lvl9pPr>
+  </p:notesStyle>
+</p:notesMaster>
+</file>
+
+<file path=ppt/notesSlides/notesSlide1.xml><?xml version="1.0" encoding="utf-8"?>
+<p:notes xmlns:a="http://schemas.openxmlformats.org/drawingml/2006/main" xmlns:r="http://schemas.openxmlformats.org/officeDocument/2006/relationships" xmlns:p="http://schemas.openxmlformats.org/presentationml/2006/main">
+  <p:cSld>
+    <p:spTree>
+      <p:nvGrpSpPr>
+        <p:cNvPr id="1" name=""/>
+        <p:cNvGrpSpPr/>
+        <p:nvPr/>
+      </p:nvGrpSpPr>
+      <p:grpSpPr>
+        <a:xfrm>
+          <a:off x="0" y="0"/>
+          <a:ext cx="0" cy="0"/>
+          <a:chOff x="0" y="0"/>
+          <a:chExt cx="0" cy="0"/>
+        </a:xfrm>
+      </p:grpSpPr>
+      <p:sp>
+        <p:nvSpPr>
+          <p:cNvPr id="2" name="Slide Image Placeholder 1"/>
+          <p:cNvSpPr>
+            <a:spLocks noGrp="1" noRot="1" noChangeAspect="1"/>
+          </p:cNvSpPr>
+          <p:nvPr>
+            <p:ph type="sldImg"/>
+          </p:nvPr>
+        </p:nvSpPr>
+        <p:spPr/>
+      </p:sp>
+      <p:sp>
+        <p:nvSpPr>
+          <p:cNvPr id="3" name="Notes Placeholder 2"/>
+          <p:cNvSpPr>
+            <a:spLocks noGrp="1"/>
+          </p:cNvSpPr>
+          <p:nvPr>
+            <p:ph type="body" idx="1"/>
+          </p:nvPr>
+        </p:nvSpPr>
+        <p:spPr/>
+        <p:txBody>
+          <a:bodyPr/>
+          <a:lstStyle/>
+          <a:p>
+            <a:endParaRPr lang="en-US" dirty="0"/>
+          </a:p>
+        </p:txBody>
+      </p:sp>
+      <p:sp>
+        <p:nvSpPr>
+          <p:cNvPr id="4" name="Slide Number Placeholder 3"/>
+          <p:cNvSpPr>
+            <a:spLocks noGrp="1"/>
+          </p:cNvSpPr>
+          <p:nvPr>
+            <p:ph type="sldNum" sz="quarter" idx="10"/>
+          </p:nvPr>
+        </p:nvSpPr>
+        <p:spPr/>
+        <p:txBody>
+          <a:bodyPr/>
+          <a:lstStyle/>
+          <a:p>
+            <a:fld id="{D9A87FF9-2FC4-B549-8557-14D4E4289040}" type="slidenum">
+              <a:rPr lang="en-US" smtClean="0"/>
+              <a:t>1</a:t>
+            </a:fld>
+            <a:endParaRPr lang="en-US"/>
+          </a:p>
+        </p:txBody>
+      </p:sp>
+    </p:spTree>
+    <p:extLst>
+      <p:ext uri="{BB962C8B-B14F-4D97-AF65-F5344CB8AC3E}">
+        <p14:creationId xmlns:p14="http://schemas.microsoft.com/office/powerpoint/2010/main" val="1207072454"/>
+      </p:ext>
+    </p:extLst>
+  </p:cSld>
+  <p:clrMapOvr>
+    <a:masterClrMapping/>
+  </p:clrMapOvr>
+</p:notes>
 </file>
 
 <file path=ppt/slideLayouts/slideLayout1.xml><?xml version="1.0" encoding="utf-8"?>
@@ -238,7 +691,7 @@
           <a:p>
             <a:fld id="{261B46AD-ABFE-C64D-9652-1027A6F25F41}" type="datetimeFigureOut">
               <a:rPr lang="en-US" smtClean="0"/>
-              <a:t>4/9/16</a:t>
+              <a:t>9/20/16</a:t>
             </a:fld>
             <a:endParaRPr lang="en-US"/>
           </a:p>
@@ -408,7 +861,7 @@
           <a:p>
             <a:fld id="{261B46AD-ABFE-C64D-9652-1027A6F25F41}" type="datetimeFigureOut">
               <a:rPr lang="en-US" smtClean="0"/>
-              <a:t>4/9/16</a:t>
+              <a:t>9/20/16</a:t>
             </a:fld>
             <a:endParaRPr lang="en-US"/>
           </a:p>
@@ -588,7 +1041,7 @@
           <a:p>
             <a:fld id="{261B46AD-ABFE-C64D-9652-1027A6F25F41}" type="datetimeFigureOut">
               <a:rPr lang="en-US" smtClean="0"/>
-              <a:t>4/9/16</a:t>
+              <a:t>9/20/16</a:t>
             </a:fld>
             <a:endParaRPr lang="en-US"/>
           </a:p>
@@ -758,7 +1211,7 @@
           <a:p>
             <a:fld id="{261B46AD-ABFE-C64D-9652-1027A6F25F41}" type="datetimeFigureOut">
               <a:rPr lang="en-US" smtClean="0"/>
-              <a:t>4/9/16</a:t>
+              <a:t>9/20/16</a:t>
             </a:fld>
             <a:endParaRPr lang="en-US"/>
           </a:p>
@@ -1002,7 +1455,7 @@
           <a:p>
             <a:fld id="{261B46AD-ABFE-C64D-9652-1027A6F25F41}" type="datetimeFigureOut">
               <a:rPr lang="en-US" smtClean="0"/>
-              <a:t>4/9/16</a:t>
+              <a:t>9/20/16</a:t>
             </a:fld>
             <a:endParaRPr lang="en-US"/>
           </a:p>
@@ -1234,7 +1687,7 @@
           <a:p>
             <a:fld id="{261B46AD-ABFE-C64D-9652-1027A6F25F41}" type="datetimeFigureOut">
               <a:rPr lang="en-US" smtClean="0"/>
-              <a:t>4/9/16</a:t>
+              <a:t>9/20/16</a:t>
             </a:fld>
             <a:endParaRPr lang="en-US"/>
           </a:p>
@@ -1601,7 +2054,7 @@
           <a:p>
             <a:fld id="{261B46AD-ABFE-C64D-9652-1027A6F25F41}" type="datetimeFigureOut">
               <a:rPr lang="en-US" smtClean="0"/>
-              <a:t>4/9/16</a:t>
+              <a:t>9/20/16</a:t>
             </a:fld>
             <a:endParaRPr lang="en-US"/>
           </a:p>
@@ -1719,7 +2172,7 @@
           <a:p>
             <a:fld id="{261B46AD-ABFE-C64D-9652-1027A6F25F41}" type="datetimeFigureOut">
               <a:rPr lang="en-US" smtClean="0"/>
-              <a:t>4/9/16</a:t>
+              <a:t>9/20/16</a:t>
             </a:fld>
             <a:endParaRPr lang="en-US"/>
           </a:p>
@@ -1814,7 +2267,7 @@
           <a:p>
             <a:fld id="{261B46AD-ABFE-C64D-9652-1027A6F25F41}" type="datetimeFigureOut">
               <a:rPr lang="en-US" smtClean="0"/>
-              <a:t>4/9/16</a:t>
+              <a:t>9/20/16</a:t>
             </a:fld>
             <a:endParaRPr lang="en-US"/>
           </a:p>
@@ -2091,7 +2544,7 @@
           <a:p>
             <a:fld id="{261B46AD-ABFE-C64D-9652-1027A6F25F41}" type="datetimeFigureOut">
               <a:rPr lang="en-US" smtClean="0"/>
-              <a:t>4/9/16</a:t>
+              <a:t>9/20/16</a:t>
             </a:fld>
             <a:endParaRPr lang="en-US"/>
           </a:p>
@@ -2348,7 +2801,7 @@
           <a:p>
             <a:fld id="{261B46AD-ABFE-C64D-9652-1027A6F25F41}" type="datetimeFigureOut">
               <a:rPr lang="en-US" smtClean="0"/>
-              <a:t>4/9/16</a:t>
+              <a:t>9/20/16</a:t>
             </a:fld>
             <a:endParaRPr lang="en-US"/>
           </a:p>
@@ -2561,7 +3014,7 @@
           <a:p>
             <a:fld id="{261B46AD-ABFE-C64D-9652-1027A6F25F41}" type="datetimeFigureOut">
               <a:rPr lang="en-US" smtClean="0"/>
-              <a:t>4/9/16</a:t>
+              <a:t>9/20/16</a:t>
             </a:fld>
             <a:endParaRPr lang="en-US"/>
           </a:p>
@@ -2974,8 +3427,8 @@
         </p:nvSpPr>
         <p:spPr>
           <a:xfrm>
-            <a:off x="157933" y="514129"/>
-            <a:ext cx="1282227" cy="430883"/>
+            <a:off x="157933" y="740557"/>
+            <a:ext cx="1282227" cy="523216"/>
           </a:xfrm>
           <a:prstGeom prst="rect">
             <a:avLst/>
@@ -2997,7 +3450,7 @@
           <a:p>
             <a:pPr algn="ctr"/>
             <a:r>
-              <a:rPr lang="en-US" sz="1100" dirty="0">
+              <a:rPr lang="en-US" sz="1400" dirty="0">
                 <a:latin typeface="Helvetica" charset="0"/>
                 <a:ea typeface="Helvetica" charset="0"/>
                 <a:cs typeface="Helvetica" charset="0"/>
@@ -3008,7 +3461,7 @@
           <a:p>
             <a:pPr algn="ctr"/>
             <a:r>
-              <a:rPr lang="en-US" sz="1100" dirty="0">
+              <a:rPr lang="en-US" sz="1400" dirty="0">
                 <a:latin typeface="Helvetica" charset="0"/>
                 <a:ea typeface="Helvetica" charset="0"/>
                 <a:cs typeface="Helvetica" charset="0"/>
@@ -3026,8 +3479,8 @@
         </p:nvSpPr>
         <p:spPr>
           <a:xfrm>
-            <a:off x="1844423" y="297440"/>
-            <a:ext cx="1431711" cy="430883"/>
+            <a:off x="1844423" y="436784"/>
+            <a:ext cx="1479578" cy="523216"/>
           </a:xfrm>
           <a:prstGeom prst="rect">
             <a:avLst/>
@@ -3049,7 +3502,7 @@
           <a:p>
             <a:pPr algn="ctr"/>
             <a:r>
-              <a:rPr lang="en-US" sz="1100" dirty="0">
+              <a:rPr lang="en-US" sz="1400" dirty="0">
                 <a:latin typeface="Helvetica" charset="0"/>
                 <a:ea typeface="Helvetica" charset="0"/>
                 <a:cs typeface="Helvetica" charset="0"/>
@@ -3067,8 +3520,8 @@
         </p:nvSpPr>
         <p:spPr>
           <a:xfrm>
-            <a:off x="3870614" y="340245"/>
-            <a:ext cx="1414976" cy="261606"/>
+            <a:off x="3642742" y="479589"/>
+            <a:ext cx="1414976" cy="307773"/>
           </a:xfrm>
           <a:prstGeom prst="rect">
             <a:avLst/>
@@ -3090,7 +3543,7 @@
           <a:p>
             <a:pPr algn="ctr"/>
             <a:r>
-              <a:rPr lang="en-US" sz="1100" dirty="0">
+              <a:rPr lang="en-US" sz="1400" dirty="0">
                 <a:latin typeface="Helvetica" charset="0"/>
                 <a:ea typeface="Helvetica" charset="0"/>
                 <a:cs typeface="Helvetica" charset="0"/>
@@ -3108,8 +3561,8 @@
         </p:nvSpPr>
         <p:spPr>
           <a:xfrm>
-            <a:off x="7467601" y="125541"/>
-            <a:ext cx="1520128" cy="769437"/>
+            <a:off x="7284731" y="308432"/>
+            <a:ext cx="1746544" cy="954103"/>
           </a:xfrm>
           <a:prstGeom prst="rect">
             <a:avLst/>
@@ -3131,7 +3584,7 @@
           <a:p>
             <a:pPr algn="ctr"/>
             <a:r>
-              <a:rPr lang="en-US" sz="1100" dirty="0">
+              <a:rPr lang="en-US" sz="1400" dirty="0">
                 <a:latin typeface="Helvetica" charset="0"/>
                 <a:ea typeface="Helvetica" charset="0"/>
                 <a:cs typeface="Helvetica" charset="0"/>
@@ -3149,8 +3602,8 @@
         </p:nvSpPr>
         <p:spPr>
           <a:xfrm>
-            <a:off x="5148880" y="2201783"/>
-            <a:ext cx="1435447" cy="430887"/>
+            <a:off x="5079208" y="3194569"/>
+            <a:ext cx="1435447" cy="523220"/>
           </a:xfrm>
           <a:prstGeom prst="rect">
             <a:avLst/>
@@ -3172,7 +3625,7 @@
           <a:p>
             <a:pPr algn="ctr"/>
             <a:r>
-              <a:rPr lang="en-US" sz="1100" dirty="0">
+              <a:rPr lang="en-US" sz="1400" dirty="0">
                 <a:latin typeface="Helvetica" charset="0"/>
                 <a:ea typeface="Helvetica" charset="0"/>
                 <a:cs typeface="Helvetica" charset="0"/>
@@ -3191,7 +3644,7 @@
         <p:spPr>
           <a:xfrm>
             <a:off x="136227" y="25789"/>
-            <a:ext cx="2380957" cy="261606"/>
+            <a:ext cx="2885647" cy="307773"/>
           </a:xfrm>
           <a:prstGeom prst="rect">
             <a:avLst/>
@@ -3213,7 +3666,7 @@
           <a:p>
             <a:pPr algn="ctr"/>
             <a:r>
-              <a:rPr lang="en-US" sz="1100" b="1" dirty="0">
+              <a:rPr lang="en-US" sz="1400" dirty="0">
                 <a:latin typeface="Helvetica" charset="0"/>
                 <a:ea typeface="Helvetica" charset="0"/>
                 <a:cs typeface="Helvetica" charset="0"/>
@@ -3231,8 +3684,8 @@
         </p:nvSpPr>
         <p:spPr>
           <a:xfrm>
-            <a:off x="147821" y="1502424"/>
-            <a:ext cx="2369363" cy="261606"/>
+            <a:off x="156530" y="2059781"/>
+            <a:ext cx="2874053" cy="307773"/>
           </a:xfrm>
           <a:prstGeom prst="rect">
             <a:avLst/>
@@ -3254,7 +3707,11 @@
           <a:p>
             <a:pPr algn="ctr"/>
             <a:r>
-              <a:rPr lang="en-US" sz="1100" b="1" dirty="0"/>
+              <a:rPr lang="en-US" sz="1400" dirty="0">
+                <a:latin typeface="Helvetica" charset="0"/>
+                <a:ea typeface="Helvetica" charset="0"/>
+                <a:cs typeface="Helvetica" charset="0"/>
+              </a:rPr>
               <a:t>Functional Data Preprocessing</a:t>
             </a:r>
           </a:p>
@@ -3268,8 +3725,8 @@
         </p:nvSpPr>
         <p:spPr>
           <a:xfrm>
-            <a:off x="156953" y="1814796"/>
-            <a:ext cx="2224939" cy="430883"/>
+            <a:off x="156953" y="2459243"/>
+            <a:ext cx="2224939" cy="523216"/>
           </a:xfrm>
           <a:prstGeom prst="rect">
             <a:avLst/>
@@ -3291,7 +3748,7 @@
           <a:p>
             <a:pPr algn="ctr"/>
             <a:r>
-              <a:rPr lang="en-US" sz="1100" dirty="0">
+              <a:rPr lang="en-US" sz="1400" dirty="0">
                 <a:latin typeface="Helvetica" charset="0"/>
                 <a:ea typeface="Helvetica" charset="0"/>
                 <a:cs typeface="Helvetica" charset="0"/>
@@ -3309,8 +3766,8 @@
         </p:nvSpPr>
         <p:spPr>
           <a:xfrm>
-            <a:off x="2921758" y="2180414"/>
-            <a:ext cx="1645647" cy="261606"/>
+            <a:off x="2712744" y="2757548"/>
+            <a:ext cx="2026124" cy="307773"/>
           </a:xfrm>
           <a:prstGeom prst="rect">
             <a:avLst/>
@@ -3332,14 +3789,14 @@
           <a:p>
             <a:pPr algn="ctr"/>
             <a:r>
-              <a:rPr lang="en-US" sz="1100" dirty="0" err="1">
+              <a:rPr lang="en-US" sz="1400" dirty="0" err="1">
                 <a:latin typeface="Helvetica" charset="0"/>
                 <a:ea typeface="Helvetica" charset="0"/>
                 <a:cs typeface="Helvetica" charset="0"/>
               </a:rPr>
               <a:t>Denoising</a:t>
             </a:r>
-            <a:endParaRPr lang="en-US" sz="1100" dirty="0">
+            <a:endParaRPr lang="en-US" sz="1400" dirty="0">
               <a:latin typeface="Helvetica" charset="0"/>
               <a:ea typeface="Helvetica" charset="0"/>
               <a:cs typeface="Helvetica" charset="0"/>
@@ -3355,8 +3812,8 @@
         </p:nvSpPr>
         <p:spPr>
           <a:xfrm>
-            <a:off x="2922015" y="2405742"/>
-            <a:ext cx="1644375" cy="261606"/>
+            <a:off x="2713001" y="3064523"/>
+            <a:ext cx="2025867" cy="307773"/>
           </a:xfrm>
           <a:prstGeom prst="rect">
             <a:avLst/>
@@ -3378,7 +3835,7 @@
           <a:p>
             <a:pPr algn="ctr"/>
             <a:r>
-              <a:rPr lang="en-US" sz="1100" dirty="0">
+              <a:rPr lang="en-US" sz="1400" dirty="0">
                 <a:latin typeface="Helvetica" charset="0"/>
                 <a:ea typeface="Helvetica" charset="0"/>
                 <a:cs typeface="Helvetica" charset="0"/>
@@ -3390,14 +3847,14 @@
       </p:sp>
       <p:sp>
         <p:nvSpPr>
-          <p:cNvPr id="14" name="TextBox 13"/>
+          <p:cNvPr id="16" name="TextBox 15"/>
           <p:cNvSpPr txBox="1"/>
           <p:nvPr/>
         </p:nvSpPr>
         <p:spPr>
           <a:xfrm>
-            <a:off x="2916284" y="1811613"/>
-            <a:ext cx="1645647" cy="261606"/>
+            <a:off x="5079208" y="2458060"/>
+            <a:ext cx="1435447" cy="738660"/>
           </a:xfrm>
           <a:prstGeom prst="rect">
             <a:avLst/>
@@ -3419,64 +3876,26 @@
           <a:p>
             <a:pPr algn="ctr"/>
             <a:r>
-              <a:rPr lang="en-US" sz="1100" dirty="0">
+              <a:rPr lang="en-US" sz="1400" dirty="0">
                 <a:latin typeface="Helvetica" charset="0"/>
                 <a:ea typeface="Helvetica" charset="0"/>
                 <a:cs typeface="Helvetica" charset="0"/>
               </a:rPr>
-              <a:t>ME-ICA</a:t>
-            </a:r>
-          </a:p>
-        </p:txBody>
-      </p:sp>
-      <p:cxnSp>
-        <p:nvCxnSpPr>
-          <p:cNvPr id="15" name="Straight Connector 14"/>
-          <p:cNvCxnSpPr>
-            <a:stCxn id="40" idx="2"/>
-            <a:endCxn id="38" idx="0"/>
-          </p:cNvCxnSpPr>
-          <p:nvPr/>
-        </p:nvCxnSpPr>
-        <p:spPr>
-          <a:xfrm>
-            <a:off x="3739107" y="2073220"/>
-            <a:ext cx="0" cy="107195"/>
-          </a:xfrm>
-          <a:prstGeom prst="line">
-            <a:avLst/>
-          </a:prstGeom>
-          <a:ln>
-            <a:solidFill>
-              <a:schemeClr val="tx1"/>
-            </a:solidFill>
-          </a:ln>
-        </p:spPr>
-        <p:style>
-          <a:lnRef idx="2">
-            <a:schemeClr val="accent1"/>
-          </a:lnRef>
-          <a:fillRef idx="0">
-            <a:schemeClr val="accent1"/>
-          </a:fillRef>
-          <a:effectRef idx="1">
-            <a:schemeClr val="accent1"/>
-          </a:effectRef>
-          <a:fontRef idx="minor">
-            <a:schemeClr val="tx1"/>
-          </a:fontRef>
-        </p:style>
-      </p:cxnSp>
-      <p:sp>
-        <p:nvSpPr>
-          <p:cNvPr id="16" name="TextBox 15"/>
+              <a:t>Reorient to MNI Standard Space </a:t>
+            </a:r>
+          </a:p>
+        </p:txBody>
+      </p:sp>
+      <p:sp>
+        <p:nvSpPr>
+          <p:cNvPr id="17" name="TextBox 16"/>
           <p:cNvSpPr txBox="1"/>
           <p:nvPr/>
         </p:nvSpPr>
         <p:spPr>
           <a:xfrm>
-            <a:off x="5148880" y="1787486"/>
-            <a:ext cx="1435447" cy="430883"/>
+            <a:off x="6837577" y="2438226"/>
+            <a:ext cx="2172270" cy="1169547"/>
           </a:xfrm>
           <a:prstGeom prst="rect">
             <a:avLst/>
@@ -3498,26 +3917,87 @@
           <a:p>
             <a:pPr algn="ctr"/>
             <a:r>
-              <a:rPr lang="en-US" sz="1100" dirty="0">
+              <a:rPr lang="en-US" sz="1400" dirty="0">
                 <a:latin typeface="Helvetica" charset="0"/>
                 <a:ea typeface="Helvetica" charset="0"/>
                 <a:cs typeface="Helvetica" charset="0"/>
               </a:rPr>
-              <a:t>Reorient to MNI Standard Space </a:t>
-            </a:r>
-          </a:p>
-        </p:txBody>
-      </p:sp>
-      <p:sp>
-        <p:nvSpPr>
-          <p:cNvPr id="17" name="TextBox 16"/>
+              <a:t>ANTs Normalization </a:t>
+            </a:r>
+            <a:r>
+              <a:rPr lang="en-US" sz="1400">
+                <a:latin typeface="Helvetica" charset="0"/>
+                <a:ea typeface="Helvetica" charset="0"/>
+                <a:cs typeface="Helvetica" charset="0"/>
+              </a:rPr>
+              <a:t>of </a:t>
+            </a:r>
+            <a:r>
+              <a:rPr lang="en-US" sz="1400" smtClean="0">
+                <a:latin typeface="Helvetica" charset="0"/>
+                <a:ea typeface="Helvetica" charset="0"/>
+                <a:cs typeface="Helvetica" charset="0"/>
+              </a:rPr>
+              <a:t>Optimally </a:t>
+            </a:r>
+            <a:r>
+              <a:rPr lang="en-US" sz="1400" dirty="0">
+                <a:latin typeface="Helvetica" charset="0"/>
+                <a:ea typeface="Helvetica" charset="0"/>
+                <a:cs typeface="Helvetica" charset="0"/>
+              </a:rPr>
+              <a:t>Combined Data to Subject-Specific </a:t>
+            </a:r>
+            <a:r>
+              <a:rPr lang="en-US" sz="1400" dirty="0" smtClean="0">
+                <a:latin typeface="Helvetica" charset="0"/>
+                <a:ea typeface="Helvetica" charset="0"/>
+                <a:cs typeface="Helvetica" charset="0"/>
+              </a:rPr>
+              <a:t>and </a:t>
+            </a:r>
+            <a:r>
+              <a:rPr lang="en-US" sz="1400" dirty="0">
+                <a:latin typeface="Helvetica" charset="0"/>
+                <a:ea typeface="Helvetica" charset="0"/>
+                <a:cs typeface="Helvetica" charset="0"/>
+              </a:rPr>
+              <a:t>MNI Template </a:t>
+            </a:r>
+            <a:r>
+              <a:rPr lang="en-US" sz="1400" dirty="0" smtClean="0">
+                <a:latin typeface="Helvetica" charset="0"/>
+                <a:ea typeface="Helvetica" charset="0"/>
+                <a:cs typeface="Helvetica" charset="0"/>
+              </a:rPr>
+              <a:t>T1 </a:t>
+            </a:r>
+            <a:r>
+              <a:rPr lang="en-US" sz="1400" dirty="0" err="1">
+                <a:latin typeface="Helvetica" charset="0"/>
+                <a:ea typeface="Helvetica" charset="0"/>
+                <a:cs typeface="Helvetica" charset="0"/>
+              </a:rPr>
+              <a:t>Coregistration</a:t>
+            </a:r>
+            <a:endParaRPr lang="en-US" sz="1400" dirty="0">
+              <a:latin typeface="Helvetica" charset="0"/>
+              <a:ea typeface="Helvetica" charset="0"/>
+              <a:cs typeface="Helvetica" charset="0"/>
+            </a:endParaRPr>
+          </a:p>
+        </p:txBody>
+      </p:sp>
+      <p:sp>
+        <p:nvSpPr>
+          <p:cNvPr id="18" name="TextBox 17"/>
           <p:cNvSpPr txBox="1"/>
           <p:nvPr/>
         </p:nvSpPr>
         <p:spPr>
           <a:xfrm>
-            <a:off x="7171275" y="1549937"/>
-            <a:ext cx="1829861" cy="1107992"/>
+            <a:off x="2712743" y="3371787"/>
+            <a:ext cx="2026125" cy="307773"/>
           </a:xfrm>
           <a:prstGeom prst="rect">
             <a:avLst/>
@@ -3539,39 +4019,26 @@
           <a:p>
             <a:pPr algn="ctr"/>
             <a:r>
-              <a:rPr lang="en-US" sz="1100" dirty="0">
+              <a:rPr lang="en-US" sz="1400" dirty="0">
                 <a:latin typeface="Helvetica" charset="0"/>
                 <a:ea typeface="Helvetica" charset="0"/>
                 <a:cs typeface="Helvetica" charset="0"/>
               </a:rPr>
-              <a:t>ANTs Normalization of Functional Optimally Combined Data to Subject-Specific Template &amp; to MNI Template via T1 </a:t>
-            </a:r>
-            <a:r>
-              <a:rPr lang="en-US" sz="1100" dirty="0" err="1">
-                <a:latin typeface="Helvetica" charset="0"/>
-                <a:ea typeface="Helvetica" charset="0"/>
-                <a:cs typeface="Helvetica" charset="0"/>
-              </a:rPr>
-              <a:t>Coregistration</a:t>
-            </a:r>
-            <a:endParaRPr lang="en-US" sz="1100" dirty="0">
-              <a:latin typeface="Helvetica" charset="0"/>
-              <a:ea typeface="Helvetica" charset="0"/>
-              <a:cs typeface="Helvetica" charset="0"/>
-            </a:endParaRPr>
-          </a:p>
-        </p:txBody>
-      </p:sp>
-      <p:sp>
-        <p:nvSpPr>
-          <p:cNvPr id="18" name="TextBox 17"/>
+              <a:t>Slice Timing Correction</a:t>
+            </a:r>
+          </a:p>
+        </p:txBody>
+      </p:sp>
+      <p:sp>
+        <p:nvSpPr>
+          <p:cNvPr id="19" name="TextBox 18"/>
           <p:cNvSpPr txBox="1"/>
           <p:nvPr/>
         </p:nvSpPr>
         <p:spPr>
           <a:xfrm>
-            <a:off x="2921757" y="2617211"/>
-            <a:ext cx="1645647" cy="261606"/>
+            <a:off x="2713001" y="3677327"/>
+            <a:ext cx="2025867" cy="307773"/>
           </a:xfrm>
           <a:prstGeom prst="rect">
             <a:avLst/>
@@ -3593,26 +4060,26 @@
           <a:p>
             <a:pPr algn="ctr"/>
             <a:r>
-              <a:rPr lang="en-US" sz="1100" dirty="0">
+              <a:rPr lang="en-US" sz="1400" dirty="0">
                 <a:latin typeface="Helvetica" charset="0"/>
                 <a:ea typeface="Helvetica" charset="0"/>
                 <a:cs typeface="Helvetica" charset="0"/>
               </a:rPr>
-              <a:t>Slice Timing Correction</a:t>
-            </a:r>
-          </a:p>
-        </p:txBody>
-      </p:sp>
-      <p:sp>
-        <p:nvSpPr>
-          <p:cNvPr id="19" name="TextBox 18"/>
+              <a:t>Skull-stripping</a:t>
+            </a:r>
+          </a:p>
+        </p:txBody>
+      </p:sp>
+      <p:sp>
+        <p:nvSpPr>
+          <p:cNvPr id="20" name="TextBox 19"/>
           <p:cNvSpPr txBox="1"/>
           <p:nvPr/>
         </p:nvSpPr>
         <p:spPr>
           <a:xfrm>
-            <a:off x="2922015" y="2826948"/>
-            <a:ext cx="1645389" cy="261606"/>
+            <a:off x="5379799" y="1046411"/>
+            <a:ext cx="1582740" cy="954107"/>
           </a:xfrm>
           <a:prstGeom prst="rect">
             <a:avLst/>
@@ -3627,33 +4094,54 @@
           </a:ln>
         </p:spPr>
         <p:txBody>
-          <a:bodyPr wrap="square" lIns="91437" tIns="45718" rIns="91437" bIns="45718" rtlCol="0">
+          <a:bodyPr wrap="square" rtlCol="0">
             <a:spAutoFit/>
           </a:bodyPr>
           <a:lstStyle/>
           <a:p>
             <a:pPr algn="ctr"/>
             <a:r>
-              <a:rPr lang="en-US" sz="1100" dirty="0">
+              <a:rPr lang="en-US" sz="1400" dirty="0" err="1">
                 <a:latin typeface="Helvetica" charset="0"/>
                 <a:ea typeface="Helvetica" charset="0"/>
                 <a:cs typeface="Helvetica" charset="0"/>
               </a:rPr>
-              <a:t>Skull-stripping</a:t>
-            </a:r>
-          </a:p>
-        </p:txBody>
-      </p:sp>
-      <p:sp>
-        <p:nvSpPr>
-          <p:cNvPr id="20" name="TextBox 19"/>
+              <a:t>FreeSurfer</a:t>
+            </a:r>
+            <a:r>
+              <a:rPr lang="en-US" sz="1400" dirty="0">
+                <a:latin typeface="Helvetica" charset="0"/>
+                <a:ea typeface="Helvetica" charset="0"/>
+                <a:cs typeface="Helvetica" charset="0"/>
+              </a:rPr>
+              <a:t> Cortical &amp; Subcortical </a:t>
+            </a:r>
+            <a:r>
+              <a:rPr lang="en-US" sz="1400" dirty="0" err="1">
+                <a:latin typeface="Helvetica" charset="0"/>
+                <a:ea typeface="Helvetica" charset="0"/>
+                <a:cs typeface="Helvetica" charset="0"/>
+              </a:rPr>
+              <a:t>Parcellation</a:t>
+            </a:r>
+            <a:endParaRPr lang="en-US" sz="1400" dirty="0">
+              <a:latin typeface="Helvetica" charset="0"/>
+              <a:ea typeface="Helvetica" charset="0"/>
+              <a:cs typeface="Helvetica" charset="0"/>
+            </a:endParaRPr>
+          </a:p>
+        </p:txBody>
+      </p:sp>
+      <p:sp>
+        <p:nvSpPr>
+          <p:cNvPr id="21" name="TextBox 20"/>
           <p:cNvSpPr txBox="1"/>
           <p:nvPr/>
         </p:nvSpPr>
         <p:spPr>
           <a:xfrm>
-            <a:off x="5812306" y="735064"/>
-            <a:ext cx="1275842" cy="769441"/>
+            <a:off x="5382855" y="308734"/>
+            <a:ext cx="1579683" cy="738660"/>
           </a:xfrm>
           <a:prstGeom prst="rect">
             <a:avLst/>
@@ -3668,54 +4156,33 @@
           </a:ln>
         </p:spPr>
         <p:txBody>
-          <a:bodyPr wrap="square" rtlCol="0">
+          <a:bodyPr wrap="square" lIns="91437" tIns="45718" rIns="91437" bIns="45718" rtlCol="0">
             <a:spAutoFit/>
           </a:bodyPr>
           <a:lstStyle/>
           <a:p>
             <a:pPr algn="ctr"/>
             <a:r>
-              <a:rPr lang="en-US" sz="1100" dirty="0" err="1">
+              <a:rPr lang="en-US" sz="1400" dirty="0">
                 <a:latin typeface="Helvetica" charset="0"/>
                 <a:ea typeface="Helvetica" charset="0"/>
                 <a:cs typeface="Helvetica" charset="0"/>
               </a:rPr>
-              <a:t>FreeSurfer</a:t>
-            </a:r>
-            <a:r>
-              <a:rPr lang="en-US" sz="1100" dirty="0">
-                <a:latin typeface="Helvetica" charset="0"/>
-                <a:ea typeface="Helvetica" charset="0"/>
-                <a:cs typeface="Helvetica" charset="0"/>
-              </a:rPr>
-              <a:t> Cortical &amp; Subcortical </a:t>
-            </a:r>
-            <a:r>
-              <a:rPr lang="en-US" sz="1100" dirty="0" err="1">
-                <a:latin typeface="Helvetica" charset="0"/>
-                <a:ea typeface="Helvetica" charset="0"/>
-                <a:cs typeface="Helvetica" charset="0"/>
-              </a:rPr>
-              <a:t>Parcellation</a:t>
-            </a:r>
-            <a:endParaRPr lang="en-US" sz="1100" dirty="0">
-              <a:latin typeface="Helvetica" charset="0"/>
-              <a:ea typeface="Helvetica" charset="0"/>
-              <a:cs typeface="Helvetica" charset="0"/>
-            </a:endParaRPr>
-          </a:p>
-        </p:txBody>
-      </p:sp>
-      <p:sp>
-        <p:nvSpPr>
-          <p:cNvPr id="21" name="TextBox 20"/>
+              <a:t>FSL FAST Segmentation for WM, GM &amp; CSF</a:t>
+            </a:r>
+          </a:p>
+        </p:txBody>
+      </p:sp>
+      <p:sp>
+        <p:nvSpPr>
+          <p:cNvPr id="24" name="TextBox 23"/>
           <p:cNvSpPr txBox="1"/>
           <p:nvPr/>
         </p:nvSpPr>
         <p:spPr>
           <a:xfrm>
-            <a:off x="5817326" y="108427"/>
-            <a:ext cx="1275841" cy="600160"/>
+            <a:off x="1844683" y="960426"/>
+            <a:ext cx="1480571" cy="738660"/>
           </a:xfrm>
           <a:prstGeom prst="rect">
             <a:avLst/>
@@ -3737,118 +4204,42 @@
           <a:p>
             <a:pPr algn="ctr"/>
             <a:r>
-              <a:rPr lang="en-US" sz="1100" dirty="0">
+              <a:rPr lang="en-US" sz="1400" dirty="0">
                 <a:latin typeface="Helvetica" charset="0"/>
                 <a:ea typeface="Helvetica" charset="0"/>
                 <a:cs typeface="Helvetica" charset="0"/>
               </a:rPr>
-              <a:t>FSL FAST Segmentation for WM, GM &amp; CSF</a:t>
-            </a:r>
-          </a:p>
-        </p:txBody>
-      </p:sp>
-      <p:sp>
-        <p:nvSpPr>
-          <p:cNvPr id="22" name="Rectangle 21"/>
-          <p:cNvSpPr/>
-          <p:nvPr/>
-        </p:nvSpPr>
-        <p:spPr>
-          <a:xfrm>
-            <a:off x="149634" y="1478433"/>
-            <a:ext cx="8851502" cy="1567930"/>
-          </a:xfrm>
-          <a:prstGeom prst="rect">
-            <a:avLst/>
-          </a:prstGeom>
-          <a:noFill/>
-          <a:ln w="3175" cmpd="sng">
-            <a:solidFill>
-              <a:srgbClr val="000000"/>
-            </a:solidFill>
-            <a:prstDash val="dot"/>
-          </a:ln>
-          <a:effectLst/>
-        </p:spPr>
-        <p:style>
-          <a:lnRef idx="1">
-            <a:schemeClr val="accent1"/>
-          </a:lnRef>
-          <a:fillRef idx="3">
-            <a:schemeClr val="accent1"/>
-          </a:fillRef>
-          <a:effectRef idx="2">
-            <a:schemeClr val="accent1"/>
-          </a:effectRef>
-          <a:fontRef idx="minor">
-            <a:schemeClr val="lt1"/>
-          </a:fontRef>
-        </p:style>
-        <p:txBody>
-          <a:bodyPr rtlCol="0" anchor="ctr"/>
-          <a:lstStyle/>
-          <a:p>
-            <a:pPr algn="ctr"/>
-            <a:endParaRPr lang="en-US" sz="826"/>
-          </a:p>
-        </p:txBody>
-      </p:sp>
-      <p:sp>
-        <p:nvSpPr>
-          <p:cNvPr id="23" name="Rectangle 22"/>
-          <p:cNvSpPr/>
-          <p:nvPr/>
-        </p:nvSpPr>
-        <p:spPr>
-          <a:xfrm>
-            <a:off x="141241" y="23961"/>
-            <a:ext cx="8851502" cy="1493421"/>
-          </a:xfrm>
-          <a:prstGeom prst="rect">
-            <a:avLst/>
-          </a:prstGeom>
-          <a:noFill/>
-          <a:ln w="3175" cmpd="sng">
-            <a:solidFill>
-              <a:srgbClr val="000000"/>
-            </a:solidFill>
-            <a:prstDash val="dot"/>
-          </a:ln>
-          <a:effectLst/>
-        </p:spPr>
-        <p:style>
-          <a:lnRef idx="1">
-            <a:schemeClr val="accent1"/>
-          </a:lnRef>
-          <a:fillRef idx="3">
-            <a:schemeClr val="accent1"/>
-          </a:fillRef>
-          <a:effectRef idx="2">
-            <a:schemeClr val="accent1"/>
-          </a:effectRef>
-          <a:fontRef idx="minor">
-            <a:schemeClr val="lt1"/>
-          </a:fontRef>
-        </p:style>
-        <p:txBody>
-          <a:bodyPr rtlCol="0" anchor="ctr"/>
-          <a:lstStyle/>
-          <a:p>
-            <a:pPr algn="ctr"/>
-            <a:endParaRPr lang="en-US" sz="826"/>
-          </a:p>
-        </p:txBody>
-      </p:sp>
-      <p:sp>
-        <p:nvSpPr>
-          <p:cNvPr id="24" name="TextBox 23"/>
+              <a:t>Reorient to </a:t>
+            </a:r>
+            <a:r>
+              <a:rPr lang="en-US" sz="1400" dirty="0" err="1">
+                <a:latin typeface="Helvetica" charset="0"/>
+                <a:ea typeface="Helvetica" charset="0"/>
+                <a:cs typeface="Helvetica" charset="0"/>
+              </a:rPr>
+              <a:t>Talairach</a:t>
+            </a:r>
+            <a:r>
+              <a:rPr lang="en-US" sz="1400" dirty="0">
+                <a:latin typeface="Helvetica" charset="0"/>
+                <a:ea typeface="Helvetica" charset="0"/>
+                <a:cs typeface="Helvetica" charset="0"/>
+              </a:rPr>
+              <a:t> Standard Space</a:t>
+            </a:r>
+          </a:p>
+        </p:txBody>
+      </p:sp>
+      <p:sp>
+        <p:nvSpPr>
+          <p:cNvPr id="25" name="TextBox 24"/>
           <p:cNvSpPr txBox="1"/>
           <p:nvPr/>
         </p:nvSpPr>
         <p:spPr>
           <a:xfrm>
-            <a:off x="1825413" y="826525"/>
-            <a:ext cx="1431711" cy="600160"/>
+            <a:off x="3642865" y="1100433"/>
+            <a:ext cx="1414976" cy="261606"/>
           </a:xfrm>
           <a:prstGeom prst="rect">
             <a:avLst/>
@@ -3875,37 +4266,21 @@
                 <a:ea typeface="Helvetica" charset="0"/>
                 <a:cs typeface="Helvetica" charset="0"/>
               </a:rPr>
-              <a:t>Reorient to </a:t>
-            </a:r>
-            <a:r>
-              <a:rPr lang="en-US" sz="1100" dirty="0" err="1">
-                <a:latin typeface="Helvetica" charset="0"/>
-                <a:ea typeface="Helvetica" charset="0"/>
-                <a:cs typeface="Helvetica" charset="0"/>
-              </a:rPr>
-              <a:t>Talairach</a:t>
-            </a:r>
-            <a:r>
-              <a:rPr lang="en-US" sz="1100" dirty="0">
-                <a:latin typeface="Helvetica" charset="0"/>
-                <a:ea typeface="Helvetica" charset="0"/>
-                <a:cs typeface="Helvetica" charset="0"/>
-              </a:rPr>
-              <a:t> Standard Space</a:t>
-            </a:r>
-          </a:p>
-        </p:txBody>
-      </p:sp>
-      <p:sp>
-        <p:nvSpPr>
-          <p:cNvPr id="25" name="TextBox 24"/>
+              <a:t>Skull-stripping</a:t>
+            </a:r>
+          </a:p>
+        </p:txBody>
+      </p:sp>
+      <p:sp>
+        <p:nvSpPr>
+          <p:cNvPr id="26" name="TextBox 25"/>
           <p:cNvSpPr txBox="1"/>
           <p:nvPr/>
         </p:nvSpPr>
         <p:spPr>
           <a:xfrm>
-            <a:off x="3860576" y="961089"/>
-            <a:ext cx="1414976" cy="261606"/>
+            <a:off x="3639657" y="887240"/>
+            <a:ext cx="1414976" cy="523216"/>
           </a:xfrm>
           <a:prstGeom prst="rect">
             <a:avLst/>
@@ -3927,26 +4302,26 @@
           <a:p>
             <a:pPr algn="ctr"/>
             <a:r>
-              <a:rPr lang="en-US" sz="1100" dirty="0">
+              <a:rPr lang="en-US" sz="1400" dirty="0">
                 <a:latin typeface="Helvetica" charset="0"/>
                 <a:ea typeface="Helvetica" charset="0"/>
                 <a:cs typeface="Helvetica" charset="0"/>
               </a:rPr>
-              <a:t>Skull-stripping</a:t>
-            </a:r>
-          </a:p>
-        </p:txBody>
-      </p:sp>
-      <p:sp>
-        <p:nvSpPr>
-          <p:cNvPr id="26" name="TextBox 25"/>
+              <a:t>Intensity Normalization</a:t>
+            </a:r>
+          </a:p>
+        </p:txBody>
+      </p:sp>
+      <p:sp>
+        <p:nvSpPr>
+          <p:cNvPr id="27" name="TextBox 26"/>
           <p:cNvSpPr txBox="1"/>
           <p:nvPr/>
         </p:nvSpPr>
         <p:spPr>
           <a:xfrm>
-            <a:off x="3860755" y="747896"/>
-            <a:ext cx="1414976" cy="430883"/>
+            <a:off x="3641791" y="1407123"/>
+            <a:ext cx="1416049" cy="523216"/>
           </a:xfrm>
           <a:prstGeom prst="rect">
             <a:avLst/>
@@ -3968,26 +4343,26 @@
           <a:p>
             <a:pPr algn="ctr"/>
             <a:r>
-              <a:rPr lang="en-US" sz="1100" dirty="0">
+              <a:rPr lang="en-US" sz="1400" dirty="0">
                 <a:latin typeface="Helvetica" charset="0"/>
                 <a:ea typeface="Helvetica" charset="0"/>
                 <a:cs typeface="Helvetica" charset="0"/>
               </a:rPr>
-              <a:t>Intensity Normalization</a:t>
-            </a:r>
-          </a:p>
-        </p:txBody>
-      </p:sp>
-      <p:sp>
-        <p:nvSpPr>
-          <p:cNvPr id="27" name="TextBox 26"/>
+              <a:t>Surface Smoothing</a:t>
+            </a:r>
+          </a:p>
+        </p:txBody>
+      </p:sp>
+      <p:sp>
+        <p:nvSpPr>
+          <p:cNvPr id="28" name="TextBox 27"/>
           <p:cNvSpPr txBox="1"/>
           <p:nvPr/>
         </p:nvSpPr>
         <p:spPr>
           <a:xfrm>
-            <a:off x="3859503" y="1180689"/>
-            <a:ext cx="1414976" cy="261606"/>
+            <a:off x="7313349" y="1518350"/>
+            <a:ext cx="1683089" cy="523216"/>
           </a:xfrm>
           <a:prstGeom prst="rect">
             <a:avLst/>
@@ -4009,26 +4384,26 @@
           <a:p>
             <a:pPr algn="ctr"/>
             <a:r>
-              <a:rPr lang="en-US" sz="1100" dirty="0">
+              <a:rPr lang="en-US" sz="1400" dirty="0">
                 <a:latin typeface="Helvetica" charset="0"/>
                 <a:ea typeface="Helvetica" charset="0"/>
                 <a:cs typeface="Helvetica" charset="0"/>
               </a:rPr>
-              <a:t>Surface Smoothing</a:t>
-            </a:r>
-          </a:p>
-        </p:txBody>
-      </p:sp>
-      <p:sp>
-        <p:nvSpPr>
-          <p:cNvPr id="28" name="TextBox 27"/>
+              <a:t>Quality Assessment</a:t>
+            </a:r>
+          </a:p>
+        </p:txBody>
+      </p:sp>
+      <p:sp>
+        <p:nvSpPr>
+          <p:cNvPr id="29" name="TextBox 28"/>
           <p:cNvSpPr txBox="1"/>
           <p:nvPr/>
         </p:nvSpPr>
         <p:spPr>
           <a:xfrm>
-            <a:off x="7631158" y="1082916"/>
-            <a:ext cx="1278277" cy="430883"/>
+            <a:off x="6837577" y="3839571"/>
+            <a:ext cx="2163808" cy="307773"/>
           </a:xfrm>
           <a:prstGeom prst="rect">
             <a:avLst/>
@@ -4050,7 +4425,7 @@
           <a:p>
             <a:pPr algn="ctr"/>
             <a:r>
-              <a:rPr lang="en-US" sz="1100" dirty="0">
+              <a:rPr lang="en-US" sz="1400" dirty="0">
                 <a:latin typeface="Helvetica" charset="0"/>
                 <a:ea typeface="Helvetica" charset="0"/>
                 <a:cs typeface="Helvetica" charset="0"/>
@@ -4060,283 +4435,16 @@
           </a:p>
         </p:txBody>
       </p:sp>
-      <p:sp>
-        <p:nvSpPr>
-          <p:cNvPr id="29" name="TextBox 28"/>
-          <p:cNvSpPr txBox="1"/>
-          <p:nvPr/>
-        </p:nvSpPr>
-        <p:spPr>
-          <a:xfrm>
-            <a:off x="7171276" y="2794856"/>
-            <a:ext cx="1830359" cy="261606"/>
-          </a:xfrm>
-          <a:prstGeom prst="rect">
-            <a:avLst/>
-          </a:prstGeom>
-          <a:solidFill>
-            <a:schemeClr val="bg1"/>
-          </a:solidFill>
-          <a:ln>
-            <a:solidFill>
-              <a:srgbClr val="000000"/>
-            </a:solidFill>
-          </a:ln>
-        </p:spPr>
-        <p:txBody>
-          <a:bodyPr wrap="square" lIns="91437" tIns="45718" rIns="91437" bIns="45718" rtlCol="0">
-            <a:spAutoFit/>
-          </a:bodyPr>
-          <a:lstStyle/>
-          <a:p>
-            <a:pPr algn="ctr"/>
-            <a:r>
-              <a:rPr lang="en-US" sz="1100" dirty="0">
-                <a:latin typeface="Helvetica" charset="0"/>
-                <a:ea typeface="Helvetica" charset="0"/>
-                <a:cs typeface="Helvetica" charset="0"/>
-              </a:rPr>
-              <a:t>Quality Assessment</a:t>
-            </a:r>
-          </a:p>
-        </p:txBody>
-      </p:sp>
       <p:cxnSp>
         <p:nvCxnSpPr>
           <p:cNvPr id="30" name="Straight Arrow Connector 29"/>
-          <p:cNvCxnSpPr>
-            <a:endCxn id="10" idx="1"/>
-          </p:cNvCxnSpPr>
-          <p:nvPr/>
-        </p:nvCxnSpPr>
-        <p:spPr>
-          <a:xfrm flipV="1">
-            <a:off x="1451900" y="512882"/>
-            <a:ext cx="392522" cy="183349"/>
-          </a:xfrm>
-          <a:prstGeom prst="straightConnector1">
-            <a:avLst/>
-          </a:prstGeom>
-          <a:ln w="12700">
-            <a:solidFill>
-              <a:schemeClr val="tx1"/>
-            </a:solidFill>
-            <a:tailEnd type="triangle" w="lg" len="lg"/>
-          </a:ln>
-          <a:effectLst/>
-        </p:spPr>
-        <p:style>
-          <a:lnRef idx="2">
-            <a:schemeClr val="accent1"/>
-          </a:lnRef>
-          <a:fillRef idx="0">
-            <a:schemeClr val="accent1"/>
-          </a:fillRef>
-          <a:effectRef idx="1">
-            <a:schemeClr val="accent1"/>
-          </a:effectRef>
-          <a:fontRef idx="minor">
-            <a:schemeClr val="tx1"/>
-          </a:fontRef>
-        </p:style>
-      </p:cxnSp>
-      <p:cxnSp>
-        <p:nvCxnSpPr>
-          <p:cNvPr id="31" name="Straight Arrow Connector 30"/>
           <p:cNvCxnSpPr/>
           <p:nvPr/>
         </p:nvCxnSpPr>
         <p:spPr>
           <a:xfrm flipV="1">
-            <a:off x="3276133" y="474015"/>
-            <a:ext cx="577746" cy="9419"/>
-          </a:xfrm>
-          <a:prstGeom prst="straightConnector1">
-            <a:avLst/>
-          </a:prstGeom>
-          <a:ln w="12700">
-            <a:solidFill>
-              <a:schemeClr val="tx1"/>
-            </a:solidFill>
-            <a:tailEnd type="triangle" w="lg" len="lg"/>
-          </a:ln>
-          <a:effectLst/>
-        </p:spPr>
-        <p:style>
-          <a:lnRef idx="2">
-            <a:schemeClr val="accent1"/>
-          </a:lnRef>
-          <a:fillRef idx="0">
-            <a:schemeClr val="accent1"/>
-          </a:fillRef>
-          <a:effectRef idx="1">
-            <a:schemeClr val="accent1"/>
-          </a:effectRef>
-          <a:fontRef idx="minor">
-            <a:schemeClr val="tx1"/>
-          </a:fontRef>
-        </p:style>
-      </p:cxnSp>
-      <p:cxnSp>
-        <p:nvCxnSpPr>
-          <p:cNvPr id="32" name="Straight Arrow Connector 31"/>
-          <p:cNvCxnSpPr/>
-          <p:nvPr/>
-        </p:nvCxnSpPr>
-        <p:spPr>
-          <a:xfrm>
-            <a:off x="5285591" y="461789"/>
-            <a:ext cx="535791" cy="0"/>
-          </a:xfrm>
-          <a:prstGeom prst="straightConnector1">
-            <a:avLst/>
-          </a:prstGeom>
-          <a:ln w="12700">
-            <a:solidFill>
-              <a:schemeClr val="tx1"/>
-            </a:solidFill>
-            <a:tailEnd type="triangle" w="lg" len="lg"/>
-          </a:ln>
-          <a:effectLst/>
-        </p:spPr>
-        <p:style>
-          <a:lnRef idx="2">
-            <a:schemeClr val="accent1"/>
-          </a:lnRef>
-          <a:fillRef idx="0">
-            <a:schemeClr val="accent1"/>
-          </a:fillRef>
-          <a:effectRef idx="1">
-            <a:schemeClr val="accent1"/>
-          </a:effectRef>
-          <a:fontRef idx="minor">
-            <a:schemeClr val="tx1"/>
-          </a:fontRef>
-        </p:style>
-      </p:cxnSp>
-      <p:cxnSp>
-        <p:nvCxnSpPr>
-          <p:cNvPr id="33" name="Straight Arrow Connector 32"/>
-          <p:cNvCxnSpPr/>
-          <p:nvPr/>
-        </p:nvCxnSpPr>
-        <p:spPr>
-          <a:xfrm flipV="1">
-            <a:off x="7103668" y="460898"/>
-            <a:ext cx="363933" cy="5603"/>
-          </a:xfrm>
-          <a:prstGeom prst="straightConnector1">
-            <a:avLst/>
-          </a:prstGeom>
-          <a:ln w="12700">
-            <a:solidFill>
-              <a:schemeClr val="tx1"/>
-            </a:solidFill>
-            <a:tailEnd type="triangle" w="lg" len="lg"/>
-          </a:ln>
-          <a:effectLst/>
-        </p:spPr>
-        <p:style>
-          <a:lnRef idx="2">
-            <a:schemeClr val="accent1"/>
-          </a:lnRef>
-          <a:fillRef idx="0">
-            <a:schemeClr val="accent1"/>
-          </a:fillRef>
-          <a:effectRef idx="1">
-            <a:schemeClr val="accent1"/>
-          </a:effectRef>
-          <a:fontRef idx="minor">
-            <a:schemeClr val="tx1"/>
-          </a:fontRef>
-        </p:style>
-      </p:cxnSp>
-      <p:cxnSp>
-        <p:nvCxnSpPr>
-          <p:cNvPr id="34" name="Straight Arrow Connector 33"/>
-          <p:cNvCxnSpPr/>
-          <p:nvPr/>
-        </p:nvCxnSpPr>
-        <p:spPr>
-          <a:xfrm flipV="1">
-            <a:off x="3281148" y="1107444"/>
-            <a:ext cx="577746" cy="9419"/>
-          </a:xfrm>
-          <a:prstGeom prst="straightConnector1">
-            <a:avLst/>
-          </a:prstGeom>
-          <a:ln w="12700">
-            <a:solidFill>
-              <a:schemeClr val="tx1"/>
-            </a:solidFill>
-            <a:tailEnd type="triangle" w="lg" len="lg"/>
-          </a:ln>
-          <a:effectLst/>
-        </p:spPr>
-        <p:style>
-          <a:lnRef idx="2">
-            <a:schemeClr val="accent1"/>
-          </a:lnRef>
-          <a:fillRef idx="0">
-            <a:schemeClr val="accent1"/>
-          </a:fillRef>
-          <a:effectRef idx="1">
-            <a:schemeClr val="accent1"/>
-          </a:effectRef>
-          <a:fontRef idx="minor">
-            <a:schemeClr val="tx1"/>
-          </a:fontRef>
-        </p:style>
-      </p:cxnSp>
-      <p:cxnSp>
-        <p:nvCxnSpPr>
-          <p:cNvPr id="35" name="Straight Arrow Connector 34"/>
-          <p:cNvCxnSpPr>
-            <a:endCxn id="49" idx="1"/>
-          </p:cNvCxnSpPr>
-          <p:nvPr/>
-        </p:nvCxnSpPr>
-        <p:spPr>
-          <a:xfrm flipV="1">
-            <a:off x="5274480" y="1119785"/>
-            <a:ext cx="532353" cy="6821"/>
-          </a:xfrm>
-          <a:prstGeom prst="straightConnector1">
-            <a:avLst/>
-          </a:prstGeom>
-          <a:ln w="12700">
-            <a:solidFill>
-              <a:schemeClr val="tx1"/>
-            </a:solidFill>
-            <a:tailEnd type="triangle" w="lg" len="lg"/>
-          </a:ln>
-          <a:effectLst/>
-        </p:spPr>
-        <p:style>
-          <a:lnRef idx="2">
-            <a:schemeClr val="accent1"/>
-          </a:lnRef>
-          <a:fillRef idx="0">
-            <a:schemeClr val="accent1"/>
-          </a:fillRef>
-          <a:effectRef idx="1">
-            <a:schemeClr val="accent1"/>
-          </a:effectRef>
-          <a:fontRef idx="minor">
-            <a:schemeClr val="tx1"/>
-          </a:fontRef>
-        </p:style>
-      </p:cxnSp>
-      <p:cxnSp>
-        <p:nvCxnSpPr>
-          <p:cNvPr id="36" name="Straight Arrow Connector 35"/>
-          <p:cNvCxnSpPr/>
-          <p:nvPr/>
-        </p:nvCxnSpPr>
-        <p:spPr>
-          <a:xfrm>
-            <a:off x="7077298" y="1102064"/>
-            <a:ext cx="555579" cy="10204"/>
+            <a:off x="1451900" y="660944"/>
+            <a:ext cx="392522" cy="183349"/>
           </a:xfrm>
           <a:prstGeom prst="straightConnector1">
             <a:avLst/>
@@ -4367,14 +4475,12 @@
       <p:cxnSp>
         <p:nvCxnSpPr>
           <p:cNvPr id="37" name="Straight Arrow Connector 36"/>
-          <p:cNvCxnSpPr>
-            <a:stCxn id="14" idx="2"/>
-          </p:cNvCxnSpPr>
+          <p:cNvCxnSpPr/>
           <p:nvPr/>
         </p:nvCxnSpPr>
         <p:spPr>
           <a:xfrm flipH="1">
-            <a:off x="8225567" y="894977"/>
+            <a:off x="8103623" y="1261135"/>
             <a:ext cx="2098" cy="231628"/>
           </a:xfrm>
           <a:prstGeom prst="straightConnector1">
@@ -4403,16 +4509,70 @@
           </a:fontRef>
         </p:style>
       </p:cxnSp>
+      <p:sp>
+        <p:nvSpPr>
+          <p:cNvPr id="42" name="TextBox 41"/>
+          <p:cNvSpPr txBox="1"/>
+          <p:nvPr/>
+        </p:nvSpPr>
+        <p:spPr>
+          <a:xfrm>
+            <a:off x="2629974" y="4059703"/>
+            <a:ext cx="3576620" cy="430887"/>
+          </a:xfrm>
+          <a:prstGeom prst="rect">
+            <a:avLst/>
+          </a:prstGeom>
+          <a:noFill/>
+        </p:spPr>
+        <p:txBody>
+          <a:bodyPr wrap="none" rtlCol="0">
+            <a:spAutoFit/>
+          </a:bodyPr>
+          <a:lstStyle/>
+          <a:p>
+            <a:r>
+              <a:rPr lang="en-US" sz="2200" b="1" dirty="0">
+                <a:latin typeface="Helvetica" charset="0"/>
+                <a:ea typeface="Helvetica" charset="0"/>
+                <a:cs typeface="Helvetica" charset="0"/>
+              </a:rPr>
+              <a:t>Stage </a:t>
+            </a:r>
+            <a:r>
+              <a:rPr lang="en-US" sz="2200" b="1" smtClean="0">
+                <a:latin typeface="Helvetica" charset="0"/>
+                <a:ea typeface="Helvetica" charset="0"/>
+                <a:cs typeface="Helvetica" charset="0"/>
+              </a:rPr>
+              <a:t>II: Data </a:t>
+            </a:r>
+            <a:r>
+              <a:rPr lang="en-US" sz="2200" b="1" dirty="0" smtClean="0">
+                <a:latin typeface="Helvetica" charset="0"/>
+                <a:ea typeface="Helvetica" charset="0"/>
+                <a:cs typeface="Helvetica" charset="0"/>
+              </a:rPr>
+              <a:t>Processing</a:t>
+            </a:r>
+            <a:endParaRPr lang="en-US" sz="2200" b="1" dirty="0">
+              <a:latin typeface="Helvetica" charset="0"/>
+              <a:ea typeface="Helvetica" charset="0"/>
+              <a:cs typeface="Helvetica" charset="0"/>
+            </a:endParaRPr>
+          </a:p>
+        </p:txBody>
+      </p:sp>
       <p:cxnSp>
         <p:nvCxnSpPr>
-          <p:cNvPr id="38" name="Straight Arrow Connector 37"/>
+          <p:cNvPr id="43" name="Straight Arrow Connector 42"/>
           <p:cNvCxnSpPr/>
           <p:nvPr/>
         </p:nvCxnSpPr>
         <p:spPr>
-          <a:xfrm flipV="1">
-            <a:off x="2388824" y="1976029"/>
-            <a:ext cx="530820" cy="4418"/>
+          <a:xfrm>
+            <a:off x="1443776" y="1070332"/>
+            <a:ext cx="392522" cy="352369"/>
           </a:xfrm>
           <a:prstGeom prst="straightConnector1">
             <a:avLst/>
@@ -4440,129 +4600,16 @@
           </a:fontRef>
         </p:style>
       </p:cxnSp>
-      <p:cxnSp>
-        <p:nvCxnSpPr>
-          <p:cNvPr id="39" name="Straight Arrow Connector 38"/>
-          <p:cNvCxnSpPr/>
-          <p:nvPr/>
-        </p:nvCxnSpPr>
-        <p:spPr>
-          <a:xfrm>
-            <a:off x="4560915" y="1919226"/>
-            <a:ext cx="587964" cy="4911"/>
-          </a:xfrm>
-          <a:prstGeom prst="straightConnector1">
-            <a:avLst/>
-          </a:prstGeom>
-          <a:ln w="12700">
-            <a:solidFill>
-              <a:schemeClr val="tx1"/>
-            </a:solidFill>
-            <a:tailEnd type="triangle" w="lg" len="lg"/>
-          </a:ln>
-          <a:effectLst/>
-        </p:spPr>
-        <p:style>
-          <a:lnRef idx="2">
-            <a:schemeClr val="accent1"/>
-          </a:lnRef>
-          <a:fillRef idx="0">
-            <a:schemeClr val="accent1"/>
-          </a:fillRef>
-          <a:effectRef idx="1">
-            <a:schemeClr val="accent1"/>
-          </a:effectRef>
-          <a:fontRef idx="minor">
-            <a:schemeClr val="tx1"/>
-          </a:fontRef>
-        </p:style>
-      </p:cxnSp>
-      <p:cxnSp>
-        <p:nvCxnSpPr>
-          <p:cNvPr id="40" name="Straight Arrow Connector 39"/>
-          <p:cNvCxnSpPr/>
-          <p:nvPr/>
-        </p:nvCxnSpPr>
-        <p:spPr>
-          <a:xfrm flipV="1">
-            <a:off x="6593529" y="1916972"/>
-            <a:ext cx="577746" cy="9419"/>
-          </a:xfrm>
-          <a:prstGeom prst="straightConnector1">
-            <a:avLst/>
-          </a:prstGeom>
-          <a:ln w="12700">
-            <a:solidFill>
-              <a:schemeClr val="tx1"/>
-            </a:solidFill>
-            <a:tailEnd type="triangle" w="lg" len="lg"/>
-          </a:ln>
-          <a:effectLst/>
-        </p:spPr>
-        <p:style>
-          <a:lnRef idx="2">
-            <a:schemeClr val="accent1"/>
-          </a:lnRef>
-          <a:fillRef idx="0">
-            <a:schemeClr val="accent1"/>
-          </a:fillRef>
-          <a:effectRef idx="1">
-            <a:schemeClr val="accent1"/>
-          </a:effectRef>
-          <a:fontRef idx="minor">
-            <a:schemeClr val="tx1"/>
-          </a:fontRef>
-        </p:style>
-      </p:cxnSp>
-      <p:cxnSp>
-        <p:nvCxnSpPr>
-          <p:cNvPr id="41" name="Straight Arrow Connector 40"/>
-          <p:cNvCxnSpPr>
-            <a:stCxn id="45" idx="2"/>
-          </p:cNvCxnSpPr>
-          <p:nvPr/>
-        </p:nvCxnSpPr>
-        <p:spPr>
-          <a:xfrm>
-            <a:off x="8086206" y="2657929"/>
-            <a:ext cx="249" cy="162810"/>
-          </a:xfrm>
-          <a:prstGeom prst="straightConnector1">
-            <a:avLst/>
-          </a:prstGeom>
-          <a:ln w="12700">
-            <a:solidFill>
-              <a:schemeClr val="tx1"/>
-            </a:solidFill>
-            <a:tailEnd type="triangle" w="lg" len="lg"/>
-          </a:ln>
-          <a:effectLst/>
-        </p:spPr>
-        <p:style>
-          <a:lnRef idx="2">
-            <a:schemeClr val="accent1"/>
-          </a:lnRef>
-          <a:fillRef idx="0">
-            <a:schemeClr val="accent1"/>
-          </a:fillRef>
-          <a:effectRef idx="1">
-            <a:schemeClr val="accent1"/>
-          </a:effectRef>
-          <a:fontRef idx="minor">
-            <a:schemeClr val="tx1"/>
-          </a:fontRef>
-        </p:style>
-      </p:cxnSp>
-      <p:sp>
-        <p:nvSpPr>
-          <p:cNvPr id="42" name="TextBox 41"/>
+      <p:sp>
+        <p:nvSpPr>
+          <p:cNvPr id="45" name="TextBox 44"/>
           <p:cNvSpPr txBox="1"/>
           <p:nvPr/>
         </p:nvSpPr>
         <p:spPr>
           <a:xfrm>
-            <a:off x="116235" y="2296855"/>
-            <a:ext cx="2053767" cy="769441"/>
+            <a:off x="2776103" y="5480960"/>
+            <a:ext cx="3284361" cy="430887"/>
           </a:xfrm>
           <a:prstGeom prst="rect">
             <a:avLst/>
@@ -4581,143 +4628,23 @@
                 <a:ea typeface="Helvetica" charset="0"/>
                 <a:cs typeface="Helvetica" charset="0"/>
               </a:rPr>
-              <a:t>Stage II: Data </a:t>
-            </a:r>
-            <a:endParaRPr lang="en-US" sz="2200" b="1" dirty="0" smtClean="0">
-              <a:latin typeface="Helvetica" charset="0"/>
-              <a:ea typeface="Helvetica" charset="0"/>
-              <a:cs typeface="Helvetica" charset="0"/>
-            </a:endParaRPr>
-          </a:p>
-          <a:p>
+              <a:t>Stage </a:t>
+            </a:r>
             <a:r>
               <a:rPr lang="en-US" sz="2200" b="1" dirty="0" smtClean="0">
                 <a:latin typeface="Helvetica" charset="0"/>
                 <a:ea typeface="Helvetica" charset="0"/>
                 <a:cs typeface="Helvetica" charset="0"/>
               </a:rPr>
-              <a:t>Processing</a:t>
-            </a:r>
-            <a:endParaRPr lang="en-US" sz="2200" b="1" dirty="0">
-              <a:latin typeface="Helvetica" charset="0"/>
-              <a:ea typeface="Helvetica" charset="0"/>
-              <a:cs typeface="Helvetica" charset="0"/>
-            </a:endParaRPr>
-          </a:p>
-        </p:txBody>
-      </p:sp>
-      <p:cxnSp>
-        <p:nvCxnSpPr>
-          <p:cNvPr id="43" name="Straight Arrow Connector 42"/>
-          <p:cNvCxnSpPr/>
-          <p:nvPr/>
-        </p:nvCxnSpPr>
-        <p:spPr>
-          <a:xfrm>
-            <a:off x="1432890" y="774237"/>
-            <a:ext cx="392522" cy="352369"/>
-          </a:xfrm>
-          <a:prstGeom prst="straightConnector1">
-            <a:avLst/>
-          </a:prstGeom>
-          <a:ln w="12700">
-            <a:solidFill>
-              <a:schemeClr val="tx1"/>
-            </a:solidFill>
-            <a:tailEnd type="triangle" w="lg" len="lg"/>
-          </a:ln>
-          <a:effectLst/>
-        </p:spPr>
-        <p:style>
-          <a:lnRef idx="2">
-            <a:schemeClr val="accent1"/>
-          </a:lnRef>
-          <a:fillRef idx="0">
-            <a:schemeClr val="accent1"/>
-          </a:fillRef>
-          <a:effectRef idx="1">
-            <a:schemeClr val="accent1"/>
-          </a:effectRef>
-          <a:fontRef idx="minor">
-            <a:schemeClr val="tx1"/>
-          </a:fontRef>
-        </p:style>
-      </p:cxnSp>
-      <p:sp>
-        <p:nvSpPr>
-          <p:cNvPr id="44" name="Rectangle 43"/>
-          <p:cNvSpPr/>
-          <p:nvPr/>
-        </p:nvSpPr>
-        <p:spPr>
-          <a:xfrm>
-            <a:off x="142313" y="3046363"/>
-            <a:ext cx="8851502" cy="1036316"/>
-          </a:xfrm>
-          <a:prstGeom prst="rect">
-            <a:avLst/>
-          </a:prstGeom>
-          <a:noFill/>
-          <a:ln w="3175" cmpd="sng">
-            <a:solidFill>
-              <a:srgbClr val="000000"/>
-            </a:solidFill>
-            <a:prstDash val="dot"/>
-          </a:ln>
-          <a:effectLst/>
-        </p:spPr>
-        <p:style>
-          <a:lnRef idx="1">
-            <a:schemeClr val="accent1"/>
-          </a:lnRef>
-          <a:fillRef idx="3">
-            <a:schemeClr val="accent1"/>
-          </a:fillRef>
-          <a:effectRef idx="2">
-            <a:schemeClr val="accent1"/>
-          </a:effectRef>
-          <a:fontRef idx="minor">
-            <a:schemeClr val="lt1"/>
-          </a:fontRef>
-        </p:style>
-        <p:txBody>
-          <a:bodyPr rtlCol="0" anchor="ctr"/>
-          <a:lstStyle/>
-          <a:p>
-            <a:pPr algn="ctr"/>
-            <a:endParaRPr lang="en-US" sz="826"/>
-          </a:p>
-        </p:txBody>
-      </p:sp>
-      <p:sp>
-        <p:nvSpPr>
-          <p:cNvPr id="45" name="TextBox 44"/>
-          <p:cNvSpPr txBox="1"/>
-          <p:nvPr/>
-        </p:nvSpPr>
-        <p:spPr>
-          <a:xfrm>
-            <a:off x="78326" y="3685437"/>
-            <a:ext cx="3284361" cy="430887"/>
-          </a:xfrm>
-          <a:prstGeom prst="rect">
-            <a:avLst/>
-          </a:prstGeom>
-          <a:noFill/>
-        </p:spPr>
-        <p:txBody>
-          <a:bodyPr wrap="none" rtlCol="0">
-            <a:spAutoFit/>
-          </a:bodyPr>
-          <a:lstStyle/>
-          <a:p>
+              <a:t>III: Data </a:t>
+            </a:r>
             <a:r>
               <a:rPr lang="en-US" sz="2200" b="1" dirty="0">
                 <a:latin typeface="Helvetica" charset="0"/>
                 <a:ea typeface="Helvetica" charset="0"/>
                 <a:cs typeface="Helvetica" charset="0"/>
               </a:rPr>
-              <a:t>Stage III: Data Analysis</a:t>
+              <a:t>Analysis</a:t>
             </a:r>
           </a:p>
         </p:txBody>
@@ -4730,8 +4657,8 @@
         </p:nvSpPr>
         <p:spPr>
           <a:xfrm>
-            <a:off x="156953" y="3063504"/>
-            <a:ext cx="2224939" cy="261606"/>
+            <a:off x="156953" y="4543995"/>
+            <a:ext cx="2224939" cy="307773"/>
           </a:xfrm>
           <a:prstGeom prst="rect">
             <a:avLst/>
@@ -4753,13 +4680,18 @@
           <a:p>
             <a:pPr algn="ctr"/>
             <a:r>
-              <a:rPr lang="en-US" sz="1100" b="1" dirty="0">
+              <a:rPr lang="en-US" sz="1400" dirty="0" smtClean="0">
                 <a:latin typeface="Helvetica" charset="0"/>
                 <a:ea typeface="Helvetica" charset="0"/>
                 <a:cs typeface="Helvetica" charset="0"/>
               </a:rPr>
               <a:t>Graph Analysis</a:t>
             </a:r>
+            <a:endParaRPr lang="en-US" sz="1400" dirty="0">
+              <a:latin typeface="Helvetica" charset="0"/>
+              <a:ea typeface="Helvetica" charset="0"/>
+              <a:cs typeface="Helvetica" charset="0"/>
+            </a:endParaRPr>
           </a:p>
         </p:txBody>
       </p:sp>
@@ -4771,8 +4703,8 @@
         </p:nvSpPr>
         <p:spPr>
           <a:xfrm>
-            <a:off x="163885" y="3378108"/>
-            <a:ext cx="2224939" cy="261606"/>
+            <a:off x="156530" y="4919560"/>
+            <a:ext cx="2232294" cy="307773"/>
           </a:xfrm>
           <a:prstGeom prst="rect">
             <a:avLst/>
@@ -4794,7 +4726,7 @@
           <a:p>
             <a:pPr algn="ctr"/>
             <a:r>
-              <a:rPr lang="en-US" sz="1100" dirty="0" err="1" smtClean="0">
+              <a:rPr lang="en-US" sz="1400" dirty="0" err="1" smtClean="0">
                 <a:latin typeface="Helvetica" charset="0"/>
                 <a:ea typeface="Helvetica" charset="0"/>
                 <a:cs typeface="Helvetica" charset="0"/>
@@ -4802,14 +4734,14 @@
               <a:t>Denoised</a:t>
             </a:r>
             <a:r>
-              <a:rPr lang="en-US" sz="1100" dirty="0" smtClean="0">
+              <a:rPr lang="en-US" sz="1400" dirty="0" smtClean="0">
                 <a:latin typeface="Helvetica" charset="0"/>
                 <a:ea typeface="Helvetica" charset="0"/>
                 <a:cs typeface="Helvetica" charset="0"/>
               </a:rPr>
               <a:t> fMRI data</a:t>
             </a:r>
-            <a:endParaRPr lang="en-US" sz="1100" dirty="0">
+            <a:endParaRPr lang="en-US" sz="1400" dirty="0">
               <a:latin typeface="Helvetica" charset="0"/>
               <a:ea typeface="Helvetica" charset="0"/>
               <a:cs typeface="Helvetica" charset="0"/>
@@ -4825,8 +4757,8 @@
         </p:nvSpPr>
         <p:spPr>
           <a:xfrm>
-            <a:off x="2644960" y="3293470"/>
-            <a:ext cx="2009130" cy="430883"/>
+            <a:off x="2714632" y="4919560"/>
+            <a:ext cx="2170880" cy="523216"/>
           </a:xfrm>
           <a:prstGeom prst="rect">
             <a:avLst/>
@@ -4848,14 +4780,14 @@
           <a:p>
             <a:pPr algn="ctr"/>
             <a:r>
-              <a:rPr lang="en-US" sz="1100" dirty="0" smtClean="0">
+              <a:rPr lang="en-US" sz="1400" dirty="0" smtClean="0">
                 <a:latin typeface="Helvetica" charset="0"/>
                 <a:ea typeface="Helvetica" charset="0"/>
                 <a:cs typeface="Helvetica" charset="0"/>
               </a:rPr>
               <a:t>Register Standard Space ROI masks to fMRI</a:t>
             </a:r>
-            <a:endParaRPr lang="en-US" sz="1100" dirty="0">
+            <a:endParaRPr lang="en-US" sz="1400" dirty="0">
               <a:latin typeface="Helvetica" charset="0"/>
               <a:ea typeface="Helvetica" charset="0"/>
               <a:cs typeface="Helvetica" charset="0"/>
@@ -4871,8 +4803,8 @@
         </p:nvSpPr>
         <p:spPr>
           <a:xfrm>
-            <a:off x="4947882" y="3378108"/>
-            <a:ext cx="1645647" cy="261606"/>
+            <a:off x="5252683" y="4919560"/>
+            <a:ext cx="1645647" cy="307773"/>
           </a:xfrm>
           <a:prstGeom prst="rect">
             <a:avLst/>
@@ -4894,7 +4826,7 @@
           <a:p>
             <a:pPr algn="ctr"/>
             <a:r>
-              <a:rPr lang="en-US" sz="1100" dirty="0" smtClean="0">
+              <a:rPr lang="en-US" sz="1400" dirty="0" smtClean="0">
                 <a:latin typeface="Helvetica" charset="0"/>
                 <a:ea typeface="Helvetica" charset="0"/>
                 <a:cs typeface="Helvetica" charset="0"/>
@@ -4902,14 +4834,14 @@
               <a:t>Extract </a:t>
             </a:r>
             <a:r>
-              <a:rPr lang="en-US" sz="1100" dirty="0" err="1" smtClean="0">
+              <a:rPr lang="en-US" sz="1400" dirty="0" err="1" smtClean="0">
                 <a:latin typeface="Helvetica" charset="0"/>
                 <a:ea typeface="Helvetica" charset="0"/>
                 <a:cs typeface="Helvetica" charset="0"/>
               </a:rPr>
               <a:t>timeseries</a:t>
             </a:r>
-            <a:endParaRPr lang="en-US" sz="1100" dirty="0">
+            <a:endParaRPr lang="en-US" sz="1400" dirty="0">
               <a:latin typeface="Helvetica" charset="0"/>
               <a:ea typeface="Helvetica" charset="0"/>
               <a:cs typeface="Helvetica" charset="0"/>
@@ -4925,8 +4857,8 @@
         </p:nvSpPr>
         <p:spPr>
           <a:xfrm>
-            <a:off x="6966223" y="3378108"/>
-            <a:ext cx="2021506" cy="261606"/>
+            <a:off x="7284730" y="4910679"/>
+            <a:ext cx="1711707" cy="523216"/>
           </a:xfrm>
           <a:prstGeom prst="rect">
             <a:avLst/>
@@ -4948,14 +4880,14 @@
           <a:p>
             <a:pPr algn="ctr"/>
             <a:r>
-              <a:rPr lang="en-US" sz="1100" dirty="0" smtClean="0">
+              <a:rPr lang="en-US" sz="1400" dirty="0" smtClean="0">
                 <a:latin typeface="Helvetica" charset="0"/>
                 <a:ea typeface="Helvetica" charset="0"/>
                 <a:cs typeface="Helvetica" charset="0"/>
               </a:rPr>
               <a:t>Higher order analysis with R</a:t>
             </a:r>
-            <a:endParaRPr lang="en-US" sz="1100" dirty="0">
+            <a:endParaRPr lang="en-US" sz="1400" dirty="0">
               <a:latin typeface="Helvetica" charset="0"/>
               <a:ea typeface="Helvetica" charset="0"/>
               <a:cs typeface="Helvetica" charset="0"/>
@@ -4971,8 +4903,8 @@
         </p:nvCxnSpPr>
         <p:spPr>
           <a:xfrm flipV="1">
-            <a:off x="2390748" y="3508912"/>
-            <a:ext cx="254212" cy="3840"/>
+            <a:off x="2382039" y="5050363"/>
+            <a:ext cx="323884" cy="3842"/>
           </a:xfrm>
           <a:prstGeom prst="straightConnector1">
             <a:avLst/>
@@ -5007,9 +4939,9 @@
           <p:nvPr/>
         </p:nvCxnSpPr>
         <p:spPr>
-          <a:xfrm flipV="1">
-            <a:off x="4654090" y="3508911"/>
-            <a:ext cx="293792" cy="1"/>
+          <a:xfrm>
+            <a:off x="4894221" y="5050363"/>
+            <a:ext cx="349753" cy="1"/>
           </a:xfrm>
           <a:prstGeom prst="straightConnector1">
             <a:avLst/>
@@ -5045,7 +4977,7 @@
         </p:nvCxnSpPr>
         <p:spPr>
           <a:xfrm>
-            <a:off x="6593529" y="3508911"/>
+            <a:off x="6898330" y="5050363"/>
             <a:ext cx="372694" cy="0"/>
           </a:xfrm>
           <a:prstGeom prst="straightConnector1">
@@ -5074,6 +5006,424 @@
           </a:fontRef>
         </p:style>
       </p:cxnSp>
+      <p:cxnSp>
+        <p:nvCxnSpPr>
+          <p:cNvPr id="55" name="Straight Arrow Connector 54"/>
+          <p:cNvCxnSpPr>
+            <a:endCxn id="6" idx="1"/>
+          </p:cNvCxnSpPr>
+          <p:nvPr/>
+        </p:nvCxnSpPr>
+        <p:spPr>
+          <a:xfrm flipV="1">
+            <a:off x="3320970" y="633476"/>
+            <a:ext cx="321772" cy="5972"/>
+          </a:xfrm>
+          <a:prstGeom prst="straightConnector1">
+            <a:avLst/>
+          </a:prstGeom>
+          <a:ln w="12700">
+            <a:solidFill>
+              <a:schemeClr val="tx1"/>
+            </a:solidFill>
+            <a:tailEnd type="triangle" w="lg" len="lg"/>
+          </a:ln>
+          <a:effectLst/>
+        </p:spPr>
+        <p:style>
+          <a:lnRef idx="2">
+            <a:schemeClr val="accent1"/>
+          </a:lnRef>
+          <a:fillRef idx="0">
+            <a:schemeClr val="accent1"/>
+          </a:fillRef>
+          <a:effectRef idx="1">
+            <a:schemeClr val="accent1"/>
+          </a:effectRef>
+          <a:fontRef idx="minor">
+            <a:schemeClr val="tx1"/>
+          </a:fontRef>
+        </p:style>
+      </p:cxnSp>
+      <p:cxnSp>
+        <p:nvCxnSpPr>
+          <p:cNvPr id="56" name="Straight Arrow Connector 55"/>
+          <p:cNvCxnSpPr/>
+          <p:nvPr/>
+        </p:nvCxnSpPr>
+        <p:spPr>
+          <a:xfrm flipV="1">
+            <a:off x="3318655" y="1291473"/>
+            <a:ext cx="321772" cy="5972"/>
+          </a:xfrm>
+          <a:prstGeom prst="straightConnector1">
+            <a:avLst/>
+          </a:prstGeom>
+          <a:ln w="12700">
+            <a:solidFill>
+              <a:schemeClr val="tx1"/>
+            </a:solidFill>
+            <a:tailEnd type="triangle" w="lg" len="lg"/>
+          </a:ln>
+          <a:effectLst/>
+        </p:spPr>
+        <p:style>
+          <a:lnRef idx="2">
+            <a:schemeClr val="accent1"/>
+          </a:lnRef>
+          <a:fillRef idx="0">
+            <a:schemeClr val="accent1"/>
+          </a:fillRef>
+          <a:effectRef idx="1">
+            <a:schemeClr val="accent1"/>
+          </a:effectRef>
+          <a:fontRef idx="minor">
+            <a:schemeClr val="tx1"/>
+          </a:fontRef>
+        </p:style>
+      </p:cxnSp>
+      <p:cxnSp>
+        <p:nvCxnSpPr>
+          <p:cNvPr id="60" name="Straight Arrow Connector 59"/>
+          <p:cNvCxnSpPr/>
+          <p:nvPr/>
+        </p:nvCxnSpPr>
+        <p:spPr>
+          <a:xfrm flipV="1">
+            <a:off x="6969091" y="1697290"/>
+            <a:ext cx="321772" cy="5972"/>
+          </a:xfrm>
+          <a:prstGeom prst="straightConnector1">
+            <a:avLst/>
+          </a:prstGeom>
+          <a:ln w="12700">
+            <a:solidFill>
+              <a:schemeClr val="tx1"/>
+            </a:solidFill>
+            <a:tailEnd type="triangle" w="lg" len="lg"/>
+          </a:ln>
+          <a:effectLst/>
+        </p:spPr>
+        <p:style>
+          <a:lnRef idx="2">
+            <a:schemeClr val="accent1"/>
+          </a:lnRef>
+          <a:fillRef idx="0">
+            <a:schemeClr val="accent1"/>
+          </a:fillRef>
+          <a:effectRef idx="1">
+            <a:schemeClr val="accent1"/>
+          </a:effectRef>
+          <a:fontRef idx="minor">
+            <a:schemeClr val="tx1"/>
+          </a:fontRef>
+        </p:style>
+      </p:cxnSp>
+      <p:cxnSp>
+        <p:nvCxnSpPr>
+          <p:cNvPr id="61" name="Straight Arrow Connector 60"/>
+          <p:cNvCxnSpPr/>
+          <p:nvPr/>
+        </p:nvCxnSpPr>
+        <p:spPr>
+          <a:xfrm flipV="1">
+            <a:off x="6968349" y="704858"/>
+            <a:ext cx="321772" cy="5972"/>
+          </a:xfrm>
+          <a:prstGeom prst="straightConnector1">
+            <a:avLst/>
+          </a:prstGeom>
+          <a:ln w="12700">
+            <a:solidFill>
+              <a:schemeClr val="tx1"/>
+            </a:solidFill>
+            <a:tailEnd type="triangle" w="lg" len="lg"/>
+          </a:ln>
+          <a:effectLst/>
+        </p:spPr>
+        <p:style>
+          <a:lnRef idx="2">
+            <a:schemeClr val="accent1"/>
+          </a:lnRef>
+          <a:fillRef idx="0">
+            <a:schemeClr val="accent1"/>
+          </a:fillRef>
+          <a:effectRef idx="1">
+            <a:schemeClr val="accent1"/>
+          </a:effectRef>
+          <a:fontRef idx="minor">
+            <a:schemeClr val="tx1"/>
+          </a:fontRef>
+        </p:style>
+      </p:cxnSp>
+      <p:cxnSp>
+        <p:nvCxnSpPr>
+          <p:cNvPr id="62" name="Straight Arrow Connector 61"/>
+          <p:cNvCxnSpPr/>
+          <p:nvPr/>
+        </p:nvCxnSpPr>
+        <p:spPr>
+          <a:xfrm flipV="1">
+            <a:off x="5063284" y="649854"/>
+            <a:ext cx="321772" cy="5972"/>
+          </a:xfrm>
+          <a:prstGeom prst="straightConnector1">
+            <a:avLst/>
+          </a:prstGeom>
+          <a:ln w="12700">
+            <a:solidFill>
+              <a:schemeClr val="tx1"/>
+            </a:solidFill>
+            <a:tailEnd type="triangle" w="lg" len="lg"/>
+          </a:ln>
+          <a:effectLst/>
+        </p:spPr>
+        <p:style>
+          <a:lnRef idx="2">
+            <a:schemeClr val="accent1"/>
+          </a:lnRef>
+          <a:fillRef idx="0">
+            <a:schemeClr val="accent1"/>
+          </a:fillRef>
+          <a:effectRef idx="1">
+            <a:schemeClr val="accent1"/>
+          </a:effectRef>
+          <a:fontRef idx="minor">
+            <a:schemeClr val="tx1"/>
+          </a:fontRef>
+        </p:style>
+      </p:cxnSp>
+      <p:cxnSp>
+        <p:nvCxnSpPr>
+          <p:cNvPr id="63" name="Straight Arrow Connector 62"/>
+          <p:cNvCxnSpPr/>
+          <p:nvPr/>
+        </p:nvCxnSpPr>
+        <p:spPr>
+          <a:xfrm flipV="1">
+            <a:off x="5061084" y="1327773"/>
+            <a:ext cx="321772" cy="5972"/>
+          </a:xfrm>
+          <a:prstGeom prst="straightConnector1">
+            <a:avLst/>
+          </a:prstGeom>
+          <a:ln w="12700">
+            <a:solidFill>
+              <a:schemeClr val="tx1"/>
+            </a:solidFill>
+            <a:tailEnd type="triangle" w="lg" len="lg"/>
+          </a:ln>
+          <a:effectLst/>
+        </p:spPr>
+        <p:style>
+          <a:lnRef idx="2">
+            <a:schemeClr val="accent1"/>
+          </a:lnRef>
+          <a:fillRef idx="0">
+            <a:schemeClr val="accent1"/>
+          </a:fillRef>
+          <a:effectRef idx="1">
+            <a:schemeClr val="accent1"/>
+          </a:effectRef>
+          <a:fontRef idx="minor">
+            <a:schemeClr val="tx1"/>
+          </a:fontRef>
+        </p:style>
+      </p:cxnSp>
+      <p:cxnSp>
+        <p:nvCxnSpPr>
+          <p:cNvPr id="67" name="Straight Arrow Connector 66"/>
+          <p:cNvCxnSpPr/>
+          <p:nvPr/>
+        </p:nvCxnSpPr>
+        <p:spPr>
+          <a:xfrm flipV="1">
+            <a:off x="2389356" y="2650148"/>
+            <a:ext cx="321772" cy="5972"/>
+          </a:xfrm>
+          <a:prstGeom prst="straightConnector1">
+            <a:avLst/>
+          </a:prstGeom>
+          <a:ln w="12700">
+            <a:solidFill>
+              <a:schemeClr val="tx1"/>
+            </a:solidFill>
+            <a:tailEnd type="triangle" w="lg" len="lg"/>
+          </a:ln>
+          <a:effectLst/>
+        </p:spPr>
+        <p:style>
+          <a:lnRef idx="2">
+            <a:schemeClr val="accent1"/>
+          </a:lnRef>
+          <a:fillRef idx="0">
+            <a:schemeClr val="accent1"/>
+          </a:fillRef>
+          <a:effectRef idx="1">
+            <a:schemeClr val="accent1"/>
+          </a:effectRef>
+          <a:fontRef idx="minor">
+            <a:schemeClr val="tx1"/>
+          </a:fontRef>
+        </p:style>
+      </p:cxnSp>
+      <p:cxnSp>
+        <p:nvCxnSpPr>
+          <p:cNvPr id="68" name="Straight Arrow Connector 67"/>
+          <p:cNvCxnSpPr/>
+          <p:nvPr/>
+        </p:nvCxnSpPr>
+        <p:spPr>
+          <a:xfrm flipV="1">
+            <a:off x="4744057" y="2612050"/>
+            <a:ext cx="321772" cy="5972"/>
+          </a:xfrm>
+          <a:prstGeom prst="straightConnector1">
+            <a:avLst/>
+          </a:prstGeom>
+          <a:ln w="12700">
+            <a:solidFill>
+              <a:schemeClr val="tx1"/>
+            </a:solidFill>
+            <a:tailEnd type="triangle" w="lg" len="lg"/>
+          </a:ln>
+          <a:effectLst/>
+        </p:spPr>
+        <p:style>
+          <a:lnRef idx="2">
+            <a:schemeClr val="accent1"/>
+          </a:lnRef>
+          <a:fillRef idx="0">
+            <a:schemeClr val="accent1"/>
+          </a:fillRef>
+          <a:effectRef idx="1">
+            <a:schemeClr val="accent1"/>
+          </a:effectRef>
+          <a:fontRef idx="minor">
+            <a:schemeClr val="tx1"/>
+          </a:fontRef>
+        </p:style>
+      </p:cxnSp>
+      <p:cxnSp>
+        <p:nvCxnSpPr>
+          <p:cNvPr id="69" name="Straight Arrow Connector 68"/>
+          <p:cNvCxnSpPr/>
+          <p:nvPr/>
+        </p:nvCxnSpPr>
+        <p:spPr>
+          <a:xfrm flipV="1">
+            <a:off x="6515805" y="2617747"/>
+            <a:ext cx="321772" cy="5972"/>
+          </a:xfrm>
+          <a:prstGeom prst="straightConnector1">
+            <a:avLst/>
+          </a:prstGeom>
+          <a:ln w="12700">
+            <a:solidFill>
+              <a:schemeClr val="tx1"/>
+            </a:solidFill>
+            <a:tailEnd type="triangle" w="lg" len="lg"/>
+          </a:ln>
+          <a:effectLst/>
+        </p:spPr>
+        <p:style>
+          <a:lnRef idx="2">
+            <a:schemeClr val="accent1"/>
+          </a:lnRef>
+          <a:fillRef idx="0">
+            <a:schemeClr val="accent1"/>
+          </a:fillRef>
+          <a:effectRef idx="1">
+            <a:schemeClr val="accent1"/>
+          </a:effectRef>
+          <a:fontRef idx="minor">
+            <a:schemeClr val="tx1"/>
+          </a:fontRef>
+        </p:style>
+      </p:cxnSp>
+      <p:cxnSp>
+        <p:nvCxnSpPr>
+          <p:cNvPr id="70" name="Straight Arrow Connector 69"/>
+          <p:cNvCxnSpPr/>
+          <p:nvPr/>
+        </p:nvCxnSpPr>
+        <p:spPr>
+          <a:xfrm flipH="1">
+            <a:off x="7974878" y="3601975"/>
+            <a:ext cx="2098" cy="231628"/>
+          </a:xfrm>
+          <a:prstGeom prst="straightConnector1">
+            <a:avLst/>
+          </a:prstGeom>
+          <a:ln w="12700">
+            <a:solidFill>
+              <a:schemeClr val="tx1"/>
+            </a:solidFill>
+            <a:tailEnd type="triangle" w="lg" len="lg"/>
+          </a:ln>
+          <a:effectLst/>
+        </p:spPr>
+        <p:style>
+          <a:lnRef idx="2">
+            <a:schemeClr val="accent1"/>
+          </a:lnRef>
+          <a:fillRef idx="0">
+            <a:schemeClr val="accent1"/>
+          </a:fillRef>
+          <a:effectRef idx="1">
+            <a:schemeClr val="accent1"/>
+          </a:effectRef>
+          <a:fontRef idx="minor">
+            <a:schemeClr val="tx1"/>
+          </a:fontRef>
+        </p:style>
+      </p:cxnSp>
+      <p:sp>
+        <p:nvSpPr>
+          <p:cNvPr id="54" name="TextBox 53"/>
+          <p:cNvSpPr txBox="1"/>
+          <p:nvPr/>
+        </p:nvSpPr>
+        <p:spPr>
+          <a:xfrm>
+            <a:off x="2712744" y="2455747"/>
+            <a:ext cx="2026124" cy="307773"/>
+          </a:xfrm>
+          <a:prstGeom prst="rect">
+            <a:avLst/>
+          </a:prstGeom>
+          <a:solidFill>
+            <a:schemeClr val="bg1"/>
+          </a:solidFill>
+          <a:ln>
+            <a:solidFill>
+              <a:srgbClr val="000000"/>
+            </a:solidFill>
+          </a:ln>
+        </p:spPr>
+        <p:txBody>
+          <a:bodyPr wrap="square" lIns="91437" tIns="45718" rIns="91437" bIns="45718" rtlCol="0">
+            <a:spAutoFit/>
+          </a:bodyPr>
+          <a:lstStyle/>
+          <a:p>
+            <a:pPr algn="ctr"/>
+            <a:r>
+              <a:rPr lang="en-US" sz="1400" smtClean="0">
+                <a:latin typeface="Helvetica" charset="0"/>
+                <a:ea typeface="Helvetica" charset="0"/>
+                <a:cs typeface="Helvetica" charset="0"/>
+              </a:rPr>
+              <a:t>ME-ICA</a:t>
+            </a:r>
+            <a:endParaRPr lang="en-US" sz="1400" dirty="0">
+              <a:latin typeface="Helvetica" charset="0"/>
+              <a:ea typeface="Helvetica" charset="0"/>
+              <a:cs typeface="Helvetica" charset="0"/>
+            </a:endParaRPr>
+          </a:p>
+        </p:txBody>
+      </p:sp>
     </p:spTree>
     <p:extLst>
       <p:ext uri="{BB962C8B-B14F-4D97-AF65-F5344CB8AC3E}">
@@ -5342,7 +5692,268 @@
   <a:extraClrSchemeLst/>
   <a:extLst>
     <a:ext uri="{05A4C25C-085E-4340-85A3-A5531E510DB2}">
-      <thm15:themeFamily xmlns:thm15="http://schemas.microsoft.com/office/thememl/2012/main" xmlns="" name="Office Theme" id="{62F939B6-93AF-4DB8-9C6B-D6C7DFDC589F}" vid="{4A3C46E8-61CC-4603-A589-7422A47A8E4A}"/>
+      <thm15:themeFamily xmlns:thm15="http://schemas.microsoft.com/office/thememl/2012/main" name="Office Theme" id="{62F939B6-93AF-4DB8-9C6B-D6C7DFDC589F}" vid="{4A3C46E8-61CC-4603-A589-7422A47A8E4A}"/>
+    </a:ext>
+  </a:extLst>
+</a:theme>
+</file>
+
+<file path=ppt/theme/theme2.xml><?xml version="1.0" encoding="utf-8"?>
+<a:theme xmlns:a="http://schemas.openxmlformats.org/drawingml/2006/main" name="Office Theme">
+  <a:themeElements>
+    <a:clrScheme name="Office">
+      <a:dk1>
+        <a:sysClr val="windowText" lastClr="000000"/>
+      </a:dk1>
+      <a:lt1>
+        <a:sysClr val="window" lastClr="FFFFFF"/>
+      </a:lt1>
+      <a:dk2>
+        <a:srgbClr val="44546A"/>
+      </a:dk2>
+      <a:lt2>
+        <a:srgbClr val="E7E6E6"/>
+      </a:lt2>
+      <a:accent1>
+        <a:srgbClr val="5B9BD5"/>
+      </a:accent1>
+      <a:accent2>
+        <a:srgbClr val="ED7D31"/>
+      </a:accent2>
+      <a:accent3>
+        <a:srgbClr val="A5A5A5"/>
+      </a:accent3>
+      <a:accent4>
+        <a:srgbClr val="FFC000"/>
+      </a:accent4>
+      <a:accent5>
+        <a:srgbClr val="4472C4"/>
+      </a:accent5>
+      <a:accent6>
+        <a:srgbClr val="70AD47"/>
+      </a:accent6>
+      <a:hlink>
+        <a:srgbClr val="0563C1"/>
+      </a:hlink>
+      <a:folHlink>
+        <a:srgbClr val="954F72"/>
+      </a:folHlink>
+    </a:clrScheme>
+    <a:fontScheme name="Office">
+      <a:majorFont>
+        <a:latin typeface="Calibri Light" panose="020F0302020204030204"/>
+        <a:ea typeface=""/>
+        <a:cs typeface=""/>
+        <a:font script="Jpan" typeface="ＭＳ Ｐゴシック"/>
+        <a:font script="Hang" typeface="맑은 고딕"/>
+        <a:font script="Hans" typeface="宋体"/>
+        <a:font script="Hant" typeface="新細明體"/>
+        <a:font script="Arab" typeface="Times New Roman"/>
+        <a:font script="Hebr" typeface="Times New Roman"/>
+        <a:font script="Thai" typeface="Angsana New"/>
+        <a:font script="Ethi" typeface="Nyala"/>
+        <a:font script="Beng" typeface="Vrinda"/>
+        <a:font script="Gujr" typeface="Shruti"/>
+        <a:font script="Khmr" typeface="MoolBoran"/>
+        <a:font script="Knda" typeface="Tunga"/>
+        <a:font script="Guru" typeface="Raavi"/>
+        <a:font script="Cans" typeface="Euphemia"/>
+        <a:font script="Cher" typeface="Plantagenet Cherokee"/>
+        <a:font script="Yiii" typeface="Microsoft Yi Baiti"/>
+        <a:font script="Tibt" typeface="Microsoft Himalaya"/>
+        <a:font script="Thaa" typeface="MV Boli"/>
+        <a:font script="Deva" typeface="Mangal"/>
+        <a:font script="Telu" typeface="Gautami"/>
+        <a:font script="Taml" typeface="Latha"/>
+        <a:font script="Syrc" typeface="Estrangelo Edessa"/>
+        <a:font script="Orya" typeface="Kalinga"/>
+        <a:font script="Mlym" typeface="Kartika"/>
+        <a:font script="Laoo" typeface="DokChampa"/>
+        <a:font script="Sinh" typeface="Iskoola Pota"/>
+        <a:font script="Mong" typeface="Mongolian Baiti"/>
+        <a:font script="Viet" typeface="Times New Roman"/>
+        <a:font script="Uigh" typeface="Microsoft Uighur"/>
+        <a:font script="Geor" typeface="Sylfaen"/>
+      </a:majorFont>
+      <a:minorFont>
+        <a:latin typeface="Calibri" panose="020F0502020204030204"/>
+        <a:ea typeface=""/>
+        <a:cs typeface=""/>
+        <a:font script="Jpan" typeface="ＭＳ Ｐゴシック"/>
+        <a:font script="Hang" typeface="맑은 고딕"/>
+        <a:font script="Hans" typeface="宋体"/>
+        <a:font script="Hant" typeface="新細明體"/>
+        <a:font script="Arab" typeface="Arial"/>
+        <a:font script="Hebr" typeface="Arial"/>
+        <a:font script="Thai" typeface="Cordia New"/>
+        <a:font script="Ethi" typeface="Nyala"/>
+        <a:font script="Beng" typeface="Vrinda"/>
+        <a:font script="Gujr" typeface="Shruti"/>
+        <a:font script="Khmr" typeface="DaunPenh"/>
+        <a:font script="Knda" typeface="Tunga"/>
+        <a:font script="Guru" typeface="Raavi"/>
+        <a:font script="Cans" typeface="Euphemia"/>
+        <a:font script="Cher" typeface="Plantagenet Cherokee"/>
+        <a:font script="Yiii" typeface="Microsoft Yi Baiti"/>
+        <a:font script="Tibt" typeface="Microsoft Himalaya"/>
+        <a:font script="Thaa" typeface="MV Boli"/>
+        <a:font script="Deva" typeface="Mangal"/>
+        <a:font script="Telu" typeface="Gautami"/>
+        <a:font script="Taml" typeface="Latha"/>
+        <a:font script="Syrc" typeface="Estrangelo Edessa"/>
+        <a:font script="Orya" typeface="Kalinga"/>
+        <a:font script="Mlym" typeface="Kartika"/>
+        <a:font script="Laoo" typeface="DokChampa"/>
+        <a:font script="Sinh" typeface="Iskoola Pota"/>
+        <a:font script="Mong" typeface="Mongolian Baiti"/>
+        <a:font script="Viet" typeface="Arial"/>
+        <a:font script="Uigh" typeface="Microsoft Uighur"/>
+        <a:font script="Geor" typeface="Sylfaen"/>
+      </a:minorFont>
+    </a:fontScheme>
+    <a:fmtScheme name="Office">
+      <a:fillStyleLst>
+        <a:solidFill>
+          <a:schemeClr val="phClr"/>
+        </a:solidFill>
+        <a:gradFill rotWithShape="1">
+          <a:gsLst>
+            <a:gs pos="0">
+              <a:schemeClr val="phClr">
+                <a:lumMod val="110000"/>
+                <a:satMod val="105000"/>
+                <a:tint val="67000"/>
+              </a:schemeClr>
+            </a:gs>
+            <a:gs pos="50000">
+              <a:schemeClr val="phClr">
+                <a:lumMod val="105000"/>
+                <a:satMod val="103000"/>
+                <a:tint val="73000"/>
+              </a:schemeClr>
+            </a:gs>
+            <a:gs pos="100000">
+              <a:schemeClr val="phClr">
+                <a:lumMod val="105000"/>
+                <a:satMod val="109000"/>
+                <a:tint val="81000"/>
+              </a:schemeClr>
+            </a:gs>
+          </a:gsLst>
+          <a:lin ang="5400000" scaled="0"/>
+        </a:gradFill>
+        <a:gradFill rotWithShape="1">
+          <a:gsLst>
+            <a:gs pos="0">
+              <a:schemeClr val="phClr">
+                <a:satMod val="103000"/>
+                <a:lumMod val="102000"/>
+                <a:tint val="94000"/>
+              </a:schemeClr>
+            </a:gs>
+            <a:gs pos="50000">
+              <a:schemeClr val="phClr">
+                <a:satMod val="110000"/>
+                <a:lumMod val="100000"/>
+                <a:shade val="100000"/>
+              </a:schemeClr>
+            </a:gs>
+            <a:gs pos="100000">
+              <a:schemeClr val="phClr">
+                <a:lumMod val="99000"/>
+                <a:satMod val="120000"/>
+                <a:shade val="78000"/>
+              </a:schemeClr>
+            </a:gs>
+          </a:gsLst>
+          <a:lin ang="5400000" scaled="0"/>
+        </a:gradFill>
+      </a:fillStyleLst>
+      <a:lnStyleLst>
+        <a:ln w="6350" cap="flat" cmpd="sng" algn="ctr">
+          <a:solidFill>
+            <a:schemeClr val="phClr"/>
+          </a:solidFill>
+          <a:prstDash val="solid"/>
+          <a:miter lim="800000"/>
+        </a:ln>
+        <a:ln w="12700" cap="flat" cmpd="sng" algn="ctr">
+          <a:solidFill>
+            <a:schemeClr val="phClr"/>
+          </a:solidFill>
+          <a:prstDash val="solid"/>
+          <a:miter lim="800000"/>
+        </a:ln>
+        <a:ln w="19050" cap="flat" cmpd="sng" algn="ctr">
+          <a:solidFill>
+            <a:schemeClr val="phClr"/>
+          </a:solidFill>
+          <a:prstDash val="solid"/>
+          <a:miter lim="800000"/>
+        </a:ln>
+      </a:lnStyleLst>
+      <a:effectStyleLst>
+        <a:effectStyle>
+          <a:effectLst/>
+        </a:effectStyle>
+        <a:effectStyle>
+          <a:effectLst/>
+        </a:effectStyle>
+        <a:effectStyle>
+          <a:effectLst>
+            <a:outerShdw blurRad="57150" dist="19050" dir="5400000" algn="ctr" rotWithShape="0">
+              <a:srgbClr val="000000">
+                <a:alpha val="63000"/>
+              </a:srgbClr>
+            </a:outerShdw>
+          </a:effectLst>
+        </a:effectStyle>
+      </a:effectStyleLst>
+      <a:bgFillStyleLst>
+        <a:solidFill>
+          <a:schemeClr val="phClr"/>
+        </a:solidFill>
+        <a:solidFill>
+          <a:schemeClr val="phClr">
+            <a:tint val="95000"/>
+            <a:satMod val="170000"/>
+          </a:schemeClr>
+        </a:solidFill>
+        <a:gradFill rotWithShape="1">
+          <a:gsLst>
+            <a:gs pos="0">
+              <a:schemeClr val="phClr">
+                <a:tint val="93000"/>
+                <a:satMod val="150000"/>
+                <a:shade val="98000"/>
+                <a:lumMod val="102000"/>
+              </a:schemeClr>
+            </a:gs>
+            <a:gs pos="50000">
+              <a:schemeClr val="phClr">
+                <a:tint val="98000"/>
+                <a:satMod val="130000"/>
+                <a:shade val="90000"/>
+                <a:lumMod val="103000"/>
+              </a:schemeClr>
+            </a:gs>
+            <a:gs pos="100000">
+              <a:schemeClr val="phClr">
+                <a:shade val="63000"/>
+                <a:satMod val="120000"/>
+              </a:schemeClr>
+            </a:gs>
+          </a:gsLst>
+          <a:lin ang="5400000" scaled="0"/>
+        </a:gradFill>
+      </a:bgFillStyleLst>
+    </a:fmtScheme>
+  </a:themeElements>
+  <a:objectDefaults/>
+  <a:extraClrSchemeLst/>
+  <a:extLst>
+    <a:ext uri="{05A4C25C-085E-4340-85A3-A5531E510DB2}">
+      <thm15:themeFamily xmlns:thm15="http://schemas.microsoft.com/office/thememl/2012/main" name="Office Theme" id="{62F939B6-93AF-4DB8-9C6B-D6C7DFDC589F}" vid="{4A3C46E8-61CC-4603-A589-7422A47A8E4A}"/>
     </a:ext>
   </a:extLst>
 </a:theme>

</xml_diff>